<commit_message>
incluindo PK FK INDITY
</commit_message>
<xml_diff>
--- a/PPTSQL.pptx
+++ b/PPTSQL.pptx
@@ -18,6 +18,11 @@
     <p:sldId id="269" r:id="rId12"/>
     <p:sldId id="270" r:id="rId13"/>
     <p:sldId id="271" r:id="rId14"/>
+    <p:sldId id="272" r:id="rId15"/>
+    <p:sldId id="273" r:id="rId16"/>
+    <p:sldId id="274" r:id="rId17"/>
+    <p:sldId id="275" r:id="rId18"/>
+    <p:sldId id="276" r:id="rId19"/>
   </p:sldIdLst>
   <p:sldSz cx="12192000" cy="6858000"/>
   <p:notesSz cx="6858000" cy="9144000"/>
@@ -127,6 +132,7 @@
 <file path=ppt/revisionInfo.xml><?xml version="1.0" encoding="utf-8"?>
 <p1510:revInfo xmlns:a="http://schemas.openxmlformats.org/drawingml/2006/main" xmlns:r="http://schemas.openxmlformats.org/officeDocument/2006/relationships" xmlns:p1510="http://schemas.microsoft.com/office/powerpoint/2015/10/main">
   <p1510:revLst>
+    <p1510:client id="{1966B1CA-F333-1A5E-3AD4-144379DE1759}" v="290" dt="2020-10-28T02:30:44.862"/>
     <p1510:client id="{28FD793F-80F2-4EBE-9C50-C17977724E01}" v="1781" dt="2020-10-27T19:55:26.798"/>
   </p1510:revLst>
 </p1510:revInfo>
@@ -7102,7 +7108,7 @@
       </p:grpSpPr>
       <p:sp>
         <p:nvSpPr>
-          <p:cNvPr id="10" name="Rectangle 9">
+          <p:cNvPr id="20" name="Rectangle 19">
             <a:extLst>
               <a:ext uri="{FF2B5EF4-FFF2-40B4-BE49-F238E27FC236}">
                 <a16:creationId xmlns:a16="http://schemas.microsoft.com/office/drawing/2014/main" xmlns="" id="{EBF87945-A001-489F-9D9B-7D9435F0B9CA}"/>
@@ -7228,7 +7234,7 @@
         </p:blipFill>
         <p:spPr>
           <a:xfrm>
-            <a:off x="841248" y="2516777"/>
+            <a:off x="596833" y="2516777"/>
             <a:ext cx="6236208" cy="3660185"/>
           </a:xfrm>
           <a:prstGeom prst="rect">
@@ -7269,9 +7275,80 @@
               <a:buChar char="•"/>
             </a:pPr>
             <a:r>
-              <a:rPr lang="en-US" sz="2200"/>
-              <a:t>Ao lado conseguimos criar uma tabela nova através do seguinte comando: </a:t>
-            </a:r>
+              <a:rPr lang="en-US" sz="2400" err="1"/>
+              <a:t>Ao</a:t>
+            </a:r>
+            <a:r>
+              <a:rPr lang="en-US" sz="2400" dirty="0"/>
+              <a:t> </a:t>
+            </a:r>
+            <a:r>
+              <a:rPr lang="en-US" sz="2400" err="1"/>
+              <a:t>lado</a:t>
+            </a:r>
+            <a:r>
+              <a:rPr lang="en-US" sz="2400" dirty="0"/>
+              <a:t> </a:t>
+            </a:r>
+            <a:r>
+              <a:rPr lang="en-US" sz="2400" err="1"/>
+              <a:t>conseguimos</a:t>
+            </a:r>
+            <a:r>
+              <a:rPr lang="en-US" sz="2400" dirty="0"/>
+              <a:t> </a:t>
+            </a:r>
+            <a:r>
+              <a:rPr lang="en-US" sz="2400" err="1"/>
+              <a:t>criar</a:t>
+            </a:r>
+            <a:r>
+              <a:rPr lang="en-US" sz="2400" dirty="0"/>
+              <a:t> </a:t>
+            </a:r>
+            <a:r>
+              <a:rPr lang="en-US" sz="2400" err="1"/>
+              <a:t>uma</a:t>
+            </a:r>
+            <a:r>
+              <a:rPr lang="en-US" sz="2400" dirty="0"/>
+              <a:t> </a:t>
+            </a:r>
+            <a:r>
+              <a:rPr lang="en-US" sz="2400" err="1"/>
+              <a:t>tabela</a:t>
+            </a:r>
+            <a:r>
+              <a:rPr lang="en-US" sz="2400"/>
+              <a:t> nova </a:t>
+            </a:r>
+            <a:r>
+              <a:rPr lang="en-US" sz="2400" err="1"/>
+              <a:t>através</a:t>
+            </a:r>
+            <a:r>
+              <a:rPr lang="en-US" sz="2400"/>
+              <a:t> do </a:t>
+            </a:r>
+            <a:r>
+              <a:rPr lang="en-US" sz="2400" err="1"/>
+              <a:t>seguinte</a:t>
+            </a:r>
+            <a:r>
+              <a:rPr lang="en-US" sz="2400" dirty="0"/>
+              <a:t> </a:t>
+            </a:r>
+            <a:r>
+              <a:rPr lang="en-US" sz="2400" err="1"/>
+              <a:t>comando</a:t>
+            </a:r>
+            <a:r>
+              <a:rPr lang="en-US" sz="2400"/>
+              <a:t>: </a:t>
+            </a:r>
+            <a:endParaRPr lang="en-US" sz="2400">
+              <a:cs typeface="Calibri"/>
+            </a:endParaRPr>
           </a:p>
           <a:p>
             <a:pPr indent="-228600">
@@ -7289,22 +7366,42 @@
               <a:rPr lang="en-US" sz="2200"/>
               <a:t>CREATE TABLE Classe (</a:t>
             </a:r>
+            <a:r>
+              <a:rPr lang="en-US" sz="2200" dirty="0"/>
+              <a:t/>
+            </a:r>
             <a:br>
+              <a:rPr lang="en-US" sz="2200" dirty="0"/>
+            </a:br>
+            <a:r>
               <a:rPr lang="en-US" sz="2200"/>
-            </a:br>
+              <a:t>Nome VARCHAR (50) NOT NULL, </a:t>
+            </a:r>
+            <a:r>
+              <a:rPr lang="en-US" sz="2200" err="1"/>
+              <a:t>NumeroClasse</a:t>
+            </a:r>
             <a:r>
               <a:rPr lang="en-US" sz="2200"/>
-              <a:t> Nome VARCHAR (50) NOT NULL, NumeroClasse INT NOT NULL </a:t>
+              <a:t> INT NOT NULL </a:t>
+            </a:r>
+            <a:r>
+              <a:rPr lang="en-US" sz="2200" dirty="0"/>
+              <a:t/>
             </a:r>
             <a:br>
-              <a:rPr lang="en-US" sz="2200"/>
+              <a:rPr lang="en-US" sz="2200" dirty="0"/>
             </a:br>
             <a:r>
               <a:rPr lang="en-US" sz="2200"/>
               <a:t>)</a:t>
             </a:r>
+            <a:r>
+              <a:rPr lang="en-US" sz="2200" dirty="0"/>
+              <a:t/>
+            </a:r>
             <a:br>
-              <a:rPr lang="en-US" sz="2200"/>
+              <a:rPr lang="en-US" sz="2200" dirty="0"/>
             </a:br>
             <a:r>
               <a:rPr lang="en-US" sz="2200"/>
@@ -7317,6 +7414,3886 @@
     <p:extLst>
       <p:ext uri="{BB962C8B-B14F-4D97-AF65-F5344CB8AC3E}">
         <p14:creationId xmlns:p14="http://schemas.microsoft.com/office/powerpoint/2010/main" val="3685968214"/>
+      </p:ext>
+    </p:extLst>
+  </p:cSld>
+  <p:clrMapOvr>
+    <a:masterClrMapping/>
+  </p:clrMapOvr>
+</p:sld>
+</file>
+
+<file path=ppt/slides/slide14.xml><?xml version="1.0" encoding="utf-8"?>
+<p:sld xmlns:a="http://schemas.openxmlformats.org/drawingml/2006/main" xmlns:r="http://schemas.openxmlformats.org/officeDocument/2006/relationships" xmlns:p="http://schemas.openxmlformats.org/presentationml/2006/main">
+  <p:cSld>
+    <p:bg>
+      <p:bgPr>
+        <a:solidFill>
+          <a:schemeClr val="bg1"/>
+        </a:solidFill>
+        <a:effectLst/>
+      </p:bgPr>
+    </p:bg>
+    <p:spTree>
+      <p:nvGrpSpPr>
+        <p:cNvPr id="1" name=""/>
+        <p:cNvGrpSpPr/>
+        <p:nvPr/>
+      </p:nvGrpSpPr>
+      <p:grpSpPr>
+        <a:xfrm>
+          <a:off x="0" y="0"/>
+          <a:ext cx="0" cy="0"/>
+          <a:chOff x="0" y="0"/>
+          <a:chExt cx="0" cy="0"/>
+        </a:xfrm>
+      </p:grpSpPr>
+      <p:sp useBgFill="1">
+        <p:nvSpPr>
+          <p:cNvPr id="5" name="Rectangle 7">
+            <a:extLst>
+              <a:ext uri="{FF2B5EF4-FFF2-40B4-BE49-F238E27FC236}">
+                <a16:creationId xmlns:a16="http://schemas.microsoft.com/office/drawing/2014/main" xmlns="" id="{46F1F2C8-798B-4CCE-A851-94AFAF350BED}"/>
+              </a:ext>
+              <a:ext uri="{C183D7F6-B498-43B3-948B-1728B52AA6E4}">
+                <adec:decorative xmlns:adec="http://schemas.microsoft.com/office/drawing/2017/decorative" xmlns="" val="1"/>
+              </a:ext>
+            </a:extLst>
+          </p:cNvPr>
+          <p:cNvSpPr>
+            <a:spLocks noGrp="1" noRot="1" noChangeAspect="1" noMove="1" noResize="1" noEditPoints="1" noAdjustHandles="1" noChangeArrowheads="1" noChangeShapeType="1" noTextEdit="1"/>
+          </p:cNvSpPr>
+          <p:nvPr>
+            <p:extLst>
+              <p:ext uri="{386F3935-93C4-4BCD-93E2-E3B085C9AB24}">
+                <p16:designElem xmlns:p16="http://schemas.microsoft.com/office/powerpoint/2015/main" xmlns="" val="1"/>
+              </p:ext>
+            </p:extLst>
+          </p:nvPr>
+        </p:nvSpPr>
+        <p:spPr>
+          <a:xfrm>
+            <a:off x="3048" y="0"/>
+            <a:ext cx="12188952" cy="6858000"/>
+          </a:xfrm>
+          <a:prstGeom prst="rect">
+            <a:avLst/>
+          </a:prstGeom>
+          <a:ln>
+            <a:noFill/>
+          </a:ln>
+        </p:spPr>
+        <p:style>
+          <a:lnRef idx="2">
+            <a:schemeClr val="accent1">
+              <a:shade val="50000"/>
+            </a:schemeClr>
+          </a:lnRef>
+          <a:fillRef idx="1">
+            <a:schemeClr val="accent1"/>
+          </a:fillRef>
+          <a:effectRef idx="0">
+            <a:schemeClr val="accent1"/>
+          </a:effectRef>
+          <a:fontRef idx="minor">
+            <a:schemeClr val="lt1"/>
+          </a:fontRef>
+        </p:style>
+        <p:txBody>
+          <a:bodyPr rtlCol="0" anchor="ctr"/>
+          <a:lstStyle/>
+          <a:p>
+            <a:pPr algn="ctr"/>
+            <a:endParaRPr lang="en-US"/>
+          </a:p>
+        </p:txBody>
+      </p:sp>
+      <p:sp>
+        <p:nvSpPr>
+          <p:cNvPr id="2" name="Título 1"/>
+          <p:cNvSpPr>
+            <a:spLocks noGrp="1"/>
+          </p:cNvSpPr>
+          <p:nvPr>
+            <p:ph type="ctrTitle"/>
+          </p:nvPr>
+        </p:nvSpPr>
+        <p:spPr>
+          <a:xfrm>
+            <a:off x="436220" y="1603159"/>
+            <a:ext cx="5210120" cy="1335326"/>
+          </a:xfrm>
+        </p:spPr>
+        <p:txBody>
+          <a:bodyPr>
+            <a:normAutofit fontScale="90000"/>
+          </a:bodyPr>
+          <a:lstStyle/>
+          <a:p>
+            <a:r>
+              <a:rPr lang="es-ES" sz="4800" dirty="0">
+                <a:latin typeface="Calibri Light"/>
+                <a:ea typeface="Verdana"/>
+                <a:cs typeface="Calibri Light"/>
+              </a:rPr>
+              <a:t>O</a:t>
+            </a:r>
+            <a:r>
+              <a:rPr lang="es-ES" sz="4800" dirty="0">
+                <a:ea typeface="Verdana"/>
+                <a:cs typeface="+mj-lt"/>
+              </a:rPr>
+              <a:t> que é Primary </a:t>
+            </a:r>
+            <a:r>
+              <a:rPr lang="es-ES" sz="4800">
+                <a:ea typeface="Verdana"/>
+                <a:cs typeface="+mj-lt"/>
+              </a:rPr>
+              <a:t>Key e Forgein Key?</a:t>
+            </a:r>
+            <a:endParaRPr lang="es-ES"/>
+          </a:p>
+        </p:txBody>
+      </p:sp>
+      <p:sp>
+        <p:nvSpPr>
+          <p:cNvPr id="6" name="Freeform: Shape 9">
+            <a:extLst>
+              <a:ext uri="{FF2B5EF4-FFF2-40B4-BE49-F238E27FC236}">
+                <a16:creationId xmlns:a16="http://schemas.microsoft.com/office/drawing/2014/main" xmlns="" id="{755E9CD0-04B0-4A3C-B291-AD913379C713}"/>
+              </a:ext>
+              <a:ext uri="{C183D7F6-B498-43B3-948B-1728B52AA6E4}">
+                <adec:decorative xmlns:adec="http://schemas.microsoft.com/office/drawing/2017/decorative" xmlns="" val="1"/>
+              </a:ext>
+            </a:extLst>
+          </p:cNvPr>
+          <p:cNvSpPr>
+            <a:spLocks noGrp="1" noRot="1" noChangeAspect="1" noMove="1" noResize="1" noEditPoints="1" noAdjustHandles="1" noChangeArrowheads="1" noChangeShapeType="1" noTextEdit="1"/>
+          </p:cNvSpPr>
+          <p:nvPr>
+            <p:extLst>
+              <p:ext uri="{386F3935-93C4-4BCD-93E2-E3B085C9AB24}">
+                <p16:designElem xmlns:p16="http://schemas.microsoft.com/office/powerpoint/2015/main" xmlns="" val="1"/>
+              </p:ext>
+            </p:extLst>
+          </p:nvPr>
+        </p:nvSpPr>
+        <p:spPr>
+          <a:xfrm>
+            <a:off x="10208695" y="1"/>
+            <a:ext cx="1135066" cy="477997"/>
+          </a:xfrm>
+          <a:custGeom>
+            <a:avLst/>
+            <a:gdLst>
+              <a:gd name="connsiteX0" fmla="*/ 0 w 1135066"/>
+              <a:gd name="connsiteY0" fmla="*/ 0 h 477997"/>
+              <a:gd name="connsiteX1" fmla="*/ 1135066 w 1135066"/>
+              <a:gd name="connsiteY1" fmla="*/ 0 h 477997"/>
+              <a:gd name="connsiteX2" fmla="*/ 1133370 w 1135066"/>
+              <a:gd name="connsiteY2" fmla="*/ 16827 h 477997"/>
+              <a:gd name="connsiteX3" fmla="*/ 567533 w 1135066"/>
+              <a:gd name="connsiteY3" fmla="*/ 477997 h 477997"/>
+              <a:gd name="connsiteX4" fmla="*/ 1696 w 1135066"/>
+              <a:gd name="connsiteY4" fmla="*/ 16827 h 477997"/>
+            </a:gdLst>
+            <a:ahLst/>
+            <a:cxnLst>
+              <a:cxn ang="0">
+                <a:pos x="connsiteX0" y="connsiteY0"/>
+              </a:cxn>
+              <a:cxn ang="0">
+                <a:pos x="connsiteX1" y="connsiteY1"/>
+              </a:cxn>
+              <a:cxn ang="0">
+                <a:pos x="connsiteX2" y="connsiteY2"/>
+              </a:cxn>
+              <a:cxn ang="0">
+                <a:pos x="connsiteX3" y="connsiteY3"/>
+              </a:cxn>
+              <a:cxn ang="0">
+                <a:pos x="connsiteX4" y="connsiteY4"/>
+              </a:cxn>
+            </a:cxnLst>
+            <a:rect l="l" t="t" r="r" b="b"/>
+            <a:pathLst>
+              <a:path w="1135066" h="477997">
+                <a:moveTo>
+                  <a:pt x="0" y="0"/>
+                </a:moveTo>
+                <a:lnTo>
+                  <a:pt x="1135066" y="0"/>
+                </a:lnTo>
+                <a:lnTo>
+                  <a:pt x="1133370" y="16827"/>
+                </a:lnTo>
+                <a:cubicBezTo>
+                  <a:pt x="1079514" y="280016"/>
+                  <a:pt x="846644" y="477997"/>
+                  <a:pt x="567533" y="477997"/>
+                </a:cubicBezTo>
+                <a:cubicBezTo>
+                  <a:pt x="288422" y="477997"/>
+                  <a:pt x="55552" y="280016"/>
+                  <a:pt x="1696" y="16827"/>
+                </a:cubicBezTo>
+                <a:close/>
+              </a:path>
+            </a:pathLst>
+          </a:custGeom>
+          <a:solidFill>
+            <a:schemeClr val="accent5"/>
+          </a:solidFill>
+          <a:ln>
+            <a:noFill/>
+          </a:ln>
+        </p:spPr>
+        <p:style>
+          <a:lnRef idx="2">
+            <a:schemeClr val="accent1">
+              <a:shade val="50000"/>
+            </a:schemeClr>
+          </a:lnRef>
+          <a:fillRef idx="1">
+            <a:schemeClr val="accent1"/>
+          </a:fillRef>
+          <a:effectRef idx="0">
+            <a:schemeClr val="accent1"/>
+          </a:effectRef>
+          <a:fontRef idx="minor">
+            <a:schemeClr val="lt1"/>
+          </a:fontRef>
+        </p:style>
+        <p:txBody>
+          <a:bodyPr wrap="square" rtlCol="0" anchor="ctr">
+            <a:noAutofit/>
+          </a:bodyPr>
+          <a:lstStyle/>
+          <a:p>
+            <a:pPr algn="ctr"/>
+            <a:endParaRPr lang="en-US"/>
+          </a:p>
+        </p:txBody>
+      </p:sp>
+      <p:sp>
+        <p:nvSpPr>
+          <p:cNvPr id="12" name="Oval 11">
+            <a:extLst>
+              <a:ext uri="{FF2B5EF4-FFF2-40B4-BE49-F238E27FC236}">
+                <a16:creationId xmlns:a16="http://schemas.microsoft.com/office/drawing/2014/main" xmlns="" id="{1DD8BF3B-6066-418C-8D1A-75C5E396FC04}"/>
+              </a:ext>
+              <a:ext uri="{C183D7F6-B498-43B3-948B-1728B52AA6E4}">
+                <adec:decorative xmlns:adec="http://schemas.microsoft.com/office/drawing/2017/decorative" xmlns="" val="1"/>
+              </a:ext>
+            </a:extLst>
+          </p:cNvPr>
+          <p:cNvSpPr>
+            <a:spLocks noGrp="1" noRot="1" noChangeAspect="1" noMove="1" noResize="1" noEditPoints="1" noAdjustHandles="1" noChangeArrowheads="1" noChangeShapeType="1" noTextEdit="1"/>
+          </p:cNvSpPr>
+          <p:nvPr>
+            <p:extLst>
+              <p:ext uri="{386F3935-93C4-4BCD-93E2-E3B085C9AB24}">
+                <p16:designElem xmlns:p16="http://schemas.microsoft.com/office/powerpoint/2015/main" xmlns="" val="1"/>
+              </p:ext>
+            </p:extLst>
+          </p:nvPr>
+        </p:nvSpPr>
+        <p:spPr>
+          <a:xfrm>
+            <a:off x="6821310" y="2624479"/>
+            <a:ext cx="812427" cy="812427"/>
+          </a:xfrm>
+          <a:prstGeom prst="ellipse">
+            <a:avLst/>
+          </a:prstGeom>
+          <a:noFill/>
+          <a:ln w="127000">
+            <a:solidFill>
+              <a:schemeClr val="accent5"/>
+            </a:solidFill>
+          </a:ln>
+        </p:spPr>
+        <p:style>
+          <a:lnRef idx="2">
+            <a:schemeClr val="accent1">
+              <a:shade val="50000"/>
+            </a:schemeClr>
+          </a:lnRef>
+          <a:fillRef idx="1">
+            <a:schemeClr val="accent1"/>
+          </a:fillRef>
+          <a:effectRef idx="0">
+            <a:schemeClr val="accent1"/>
+          </a:effectRef>
+          <a:fontRef idx="minor">
+            <a:schemeClr val="lt1"/>
+          </a:fontRef>
+        </p:style>
+        <p:txBody>
+          <a:bodyPr rtlCol="0" anchor="ctr"/>
+          <a:lstStyle/>
+          <a:p>
+            <a:pPr algn="ctr"/>
+            <a:endParaRPr lang="en-US" dirty="0"/>
+          </a:p>
+        </p:txBody>
+      </p:sp>
+      <p:sp>
+        <p:nvSpPr>
+          <p:cNvPr id="14" name="Block Arc 13">
+            <a:extLst>
+              <a:ext uri="{FF2B5EF4-FFF2-40B4-BE49-F238E27FC236}">
+                <a16:creationId xmlns:a16="http://schemas.microsoft.com/office/drawing/2014/main" xmlns="" id="{80BC66F9-7A74-4286-AD22-1174052CC22C}"/>
+              </a:ext>
+              <a:ext uri="{C183D7F6-B498-43B3-948B-1728B52AA6E4}">
+                <adec:decorative xmlns:adec="http://schemas.microsoft.com/office/drawing/2017/decorative" xmlns="" val="1"/>
+              </a:ext>
+            </a:extLst>
+          </p:cNvPr>
+          <p:cNvSpPr>
+            <a:spLocks noGrp="1" noRot="1" noChangeAspect="1" noMove="1" noResize="1" noEditPoints="1" noAdjustHandles="1" noChangeArrowheads="1" noChangeShapeType="1" noTextEdit="1"/>
+          </p:cNvSpPr>
+          <p:nvPr>
+            <p:extLst>
+              <p:ext uri="{386F3935-93C4-4BCD-93E2-E3B085C9AB24}">
+                <p16:designElem xmlns:p16="http://schemas.microsoft.com/office/powerpoint/2015/main" xmlns="" val="1"/>
+              </p:ext>
+            </p:extLst>
+          </p:nvPr>
+        </p:nvSpPr>
+        <p:spPr>
+          <a:xfrm rot="16200000">
+            <a:off x="8912417" y="1202394"/>
+            <a:ext cx="2387600" cy="2387600"/>
+          </a:xfrm>
+          <a:prstGeom prst="blockArc">
+            <a:avLst/>
+          </a:prstGeom>
+          <a:solidFill>
+            <a:schemeClr val="accent2"/>
+          </a:solidFill>
+          <a:ln>
+            <a:noFill/>
+          </a:ln>
+        </p:spPr>
+        <p:style>
+          <a:lnRef idx="2">
+            <a:schemeClr val="accent1">
+              <a:shade val="50000"/>
+            </a:schemeClr>
+          </a:lnRef>
+          <a:fillRef idx="1">
+            <a:schemeClr val="accent1"/>
+          </a:fillRef>
+          <a:effectRef idx="0">
+            <a:schemeClr val="accent1"/>
+          </a:effectRef>
+          <a:fontRef idx="minor">
+            <a:schemeClr val="lt1"/>
+          </a:fontRef>
+        </p:style>
+        <p:txBody>
+          <a:bodyPr rtlCol="0" anchor="ctr"/>
+          <a:lstStyle/>
+          <a:p>
+            <a:pPr algn="ctr"/>
+            <a:endParaRPr lang="en-US">
+              <a:solidFill>
+                <a:schemeClr val="tx1"/>
+              </a:solidFill>
+            </a:endParaRPr>
+          </a:p>
+        </p:txBody>
+      </p:sp>
+      <p:sp>
+        <p:nvSpPr>
+          <p:cNvPr id="16" name="Freeform: Shape 15">
+            <a:extLst>
+              <a:ext uri="{FF2B5EF4-FFF2-40B4-BE49-F238E27FC236}">
+                <a16:creationId xmlns:a16="http://schemas.microsoft.com/office/drawing/2014/main" xmlns="" id="{D8142CC3-2B5C-48E6-9DF0-6C8ACBAF23EF}"/>
+              </a:ext>
+              <a:ext uri="{C183D7F6-B498-43B3-948B-1728B52AA6E4}">
+                <adec:decorative xmlns:adec="http://schemas.microsoft.com/office/drawing/2017/decorative" xmlns="" val="1"/>
+              </a:ext>
+            </a:extLst>
+          </p:cNvPr>
+          <p:cNvSpPr>
+            <a:spLocks noGrp="1" noRot="1" noChangeAspect="1" noMove="1" noResize="1" noEditPoints="1" noAdjustHandles="1" noChangeArrowheads="1" noChangeShapeType="1" noTextEdit="1"/>
+          </p:cNvSpPr>
+          <p:nvPr>
+            <p:extLst>
+              <p:ext uri="{386F3935-93C4-4BCD-93E2-E3B085C9AB24}">
+                <p16:designElem xmlns:p16="http://schemas.microsoft.com/office/powerpoint/2015/main" xmlns="" val="1"/>
+              </p:ext>
+            </p:extLst>
+          </p:nvPr>
+        </p:nvSpPr>
+        <p:spPr>
+          <a:xfrm>
+            <a:off x="6821310" y="0"/>
+            <a:ext cx="2315251" cy="1550992"/>
+          </a:xfrm>
+          <a:custGeom>
+            <a:avLst/>
+            <a:gdLst>
+              <a:gd name="connsiteX0" fmla="*/ 0 w 2315251"/>
+              <a:gd name="connsiteY0" fmla="*/ 0 h 1550992"/>
+              <a:gd name="connsiteX1" fmla="*/ 138700 w 2315251"/>
+              <a:gd name="connsiteY1" fmla="*/ 0 h 1550992"/>
+              <a:gd name="connsiteX2" fmla="*/ 138700 w 2315251"/>
+              <a:gd name="connsiteY2" fmla="*/ 1361400 h 1550992"/>
+              <a:gd name="connsiteX3" fmla="*/ 2107387 w 2315251"/>
+              <a:gd name="connsiteY3" fmla="*/ 222673 h 1550992"/>
+              <a:gd name="connsiteX4" fmla="*/ 1722420 w 2315251"/>
+              <a:gd name="connsiteY4" fmla="*/ 0 h 1550992"/>
+              <a:gd name="connsiteX5" fmla="*/ 1999436 w 2315251"/>
+              <a:gd name="connsiteY5" fmla="*/ 0 h 1550992"/>
+              <a:gd name="connsiteX6" fmla="*/ 2280549 w 2315251"/>
+              <a:gd name="connsiteY6" fmla="*/ 162605 h 1550992"/>
+              <a:gd name="connsiteX7" fmla="*/ 2305953 w 2315251"/>
+              <a:gd name="connsiteY7" fmla="*/ 257336 h 1550992"/>
+              <a:gd name="connsiteX8" fmla="*/ 2280549 w 2315251"/>
+              <a:gd name="connsiteY8" fmla="*/ 282740 h 1550992"/>
+              <a:gd name="connsiteX9" fmla="*/ 104026 w 2315251"/>
+              <a:gd name="connsiteY9" fmla="*/ 1541710 h 1550992"/>
+              <a:gd name="connsiteX10" fmla="*/ 69351 w 2315251"/>
+              <a:gd name="connsiteY10" fmla="*/ 1550992 h 1550992"/>
+              <a:gd name="connsiteX11" fmla="*/ 0 w 2315251"/>
+              <a:gd name="connsiteY11" fmla="*/ 1481643 h 1550992"/>
+            </a:gdLst>
+            <a:ahLst/>
+            <a:cxnLst>
+              <a:cxn ang="0">
+                <a:pos x="connsiteX0" y="connsiteY0"/>
+              </a:cxn>
+              <a:cxn ang="0">
+                <a:pos x="connsiteX1" y="connsiteY1"/>
+              </a:cxn>
+              <a:cxn ang="0">
+                <a:pos x="connsiteX2" y="connsiteY2"/>
+              </a:cxn>
+              <a:cxn ang="0">
+                <a:pos x="connsiteX3" y="connsiteY3"/>
+              </a:cxn>
+              <a:cxn ang="0">
+                <a:pos x="connsiteX4" y="connsiteY4"/>
+              </a:cxn>
+              <a:cxn ang="0">
+                <a:pos x="connsiteX5" y="connsiteY5"/>
+              </a:cxn>
+              <a:cxn ang="0">
+                <a:pos x="connsiteX6" y="connsiteY6"/>
+              </a:cxn>
+              <a:cxn ang="0">
+                <a:pos x="connsiteX7" y="connsiteY7"/>
+              </a:cxn>
+              <a:cxn ang="0">
+                <a:pos x="connsiteX8" y="connsiteY8"/>
+              </a:cxn>
+              <a:cxn ang="0">
+                <a:pos x="connsiteX9" y="connsiteY9"/>
+              </a:cxn>
+              <a:cxn ang="0">
+                <a:pos x="connsiteX10" y="connsiteY10"/>
+              </a:cxn>
+              <a:cxn ang="0">
+                <a:pos x="connsiteX11" y="connsiteY11"/>
+              </a:cxn>
+            </a:cxnLst>
+            <a:rect l="l" t="t" r="r" b="b"/>
+            <a:pathLst>
+              <a:path w="2315251" h="1550992">
+                <a:moveTo>
+                  <a:pt x="0" y="0"/>
+                </a:moveTo>
+                <a:lnTo>
+                  <a:pt x="138700" y="0"/>
+                </a:lnTo>
+                <a:lnTo>
+                  <a:pt x="138700" y="1361400"/>
+                </a:lnTo>
+                <a:lnTo>
+                  <a:pt x="2107387" y="222673"/>
+                </a:lnTo>
+                <a:lnTo>
+                  <a:pt x="1722420" y="0"/>
+                </a:lnTo>
+                <a:lnTo>
+                  <a:pt x="1999436" y="0"/>
+                </a:lnTo>
+                <a:lnTo>
+                  <a:pt x="2280549" y="162605"/>
+                </a:lnTo>
+                <a:cubicBezTo>
+                  <a:pt x="2313720" y="181745"/>
+                  <a:pt x="2325104" y="224155"/>
+                  <a:pt x="2305953" y="257336"/>
+                </a:cubicBezTo>
+                <a:cubicBezTo>
+                  <a:pt x="2299872" y="267889"/>
+                  <a:pt x="2291101" y="276648"/>
+                  <a:pt x="2280549" y="282740"/>
+                </a:cubicBezTo>
+                <a:lnTo>
+                  <a:pt x="104026" y="1541710"/>
+                </a:lnTo>
+                <a:cubicBezTo>
+                  <a:pt x="93484" y="1547802"/>
+                  <a:pt x="81523" y="1551003"/>
+                  <a:pt x="69351" y="1550992"/>
+                </a:cubicBezTo>
+                <a:cubicBezTo>
+                  <a:pt x="31049" y="1550992"/>
+                  <a:pt x="0" y="1519944"/>
+                  <a:pt x="0" y="1481643"/>
+                </a:cubicBezTo>
+                <a:close/>
+              </a:path>
+            </a:pathLst>
+          </a:custGeom>
+          <a:solidFill>
+            <a:schemeClr val="accent6"/>
+          </a:solidFill>
+          <a:ln w="9525" cap="flat">
+            <a:noFill/>
+            <a:prstDash val="solid"/>
+            <a:miter/>
+          </a:ln>
+        </p:spPr>
+        <p:txBody>
+          <a:bodyPr rtlCol="0" anchor="ctr"/>
+          <a:lstStyle/>
+          <a:p>
+            <a:endParaRPr lang="en-US" dirty="0"/>
+          </a:p>
+        </p:txBody>
+      </p:sp>
+      <p:cxnSp>
+        <p:nvCxnSpPr>
+          <p:cNvPr id="18" name="Straight Connector 17">
+            <a:extLst>
+              <a:ext uri="{FF2B5EF4-FFF2-40B4-BE49-F238E27FC236}">
+                <a16:creationId xmlns:a16="http://schemas.microsoft.com/office/drawing/2014/main" xmlns="" id="{7B2D303B-3DD0-4319-9EAD-361847FEC71D}"/>
+              </a:ext>
+              <a:ext uri="{C183D7F6-B498-43B3-948B-1728B52AA6E4}">
+                <adec:decorative xmlns:adec="http://schemas.microsoft.com/office/drawing/2017/decorative" xmlns="" val="1"/>
+              </a:ext>
+            </a:extLst>
+          </p:cNvPr>
+          <p:cNvCxnSpPr>
+            <a:cxnSpLocks noGrp="1" noRot="1" noChangeAspect="1" noMove="1" noResize="1" noEditPoints="1" noAdjustHandles="1" noChangeArrowheads="1" noChangeShapeType="1"/>
+          </p:cNvCxnSpPr>
+          <p:nvPr>
+            <p:extLst>
+              <p:ext uri="{386F3935-93C4-4BCD-93E2-E3B085C9AB24}">
+                <p16:designElem xmlns:p16="http://schemas.microsoft.com/office/powerpoint/2015/main" xmlns="" val="1"/>
+              </p:ext>
+            </p:extLst>
+          </p:nvPr>
+        </p:nvCxnSpPr>
+        <p:spPr>
+          <a:xfrm>
+            <a:off x="11724638" y="1331572"/>
+            <a:ext cx="0" cy="1597708"/>
+          </a:xfrm>
+          <a:prstGeom prst="line">
+            <a:avLst/>
+          </a:prstGeom>
+          <a:ln w="127000" cap="rnd">
+            <a:solidFill>
+              <a:schemeClr val="accent4"/>
+            </a:solidFill>
+            <a:prstDash val="dash"/>
+          </a:ln>
+        </p:spPr>
+        <p:style>
+          <a:lnRef idx="1">
+            <a:schemeClr val="accent1"/>
+          </a:lnRef>
+          <a:fillRef idx="0">
+            <a:schemeClr val="accent1"/>
+          </a:fillRef>
+          <a:effectRef idx="0">
+            <a:schemeClr val="accent1"/>
+          </a:effectRef>
+          <a:fontRef idx="minor">
+            <a:schemeClr val="tx1"/>
+          </a:fontRef>
+        </p:style>
+      </p:cxnSp>
+      <p:sp>
+        <p:nvSpPr>
+          <p:cNvPr id="20" name="Freeform: Shape 19">
+            <a:extLst>
+              <a:ext uri="{FF2B5EF4-FFF2-40B4-BE49-F238E27FC236}">
+                <a16:creationId xmlns:a16="http://schemas.microsoft.com/office/drawing/2014/main" xmlns="" id="{46A89C79-8EF3-4AF9-B3D9-59A883F41C83}"/>
+              </a:ext>
+              <a:ext uri="{C183D7F6-B498-43B3-948B-1728B52AA6E4}">
+                <adec:decorative xmlns:adec="http://schemas.microsoft.com/office/drawing/2017/decorative" xmlns="" val="1"/>
+              </a:ext>
+            </a:extLst>
+          </p:cNvPr>
+          <p:cNvSpPr>
+            <a:spLocks noGrp="1" noRot="1" noChangeAspect="1" noMove="1" noResize="1" noEditPoints="1" noAdjustHandles="1" noChangeArrowheads="1" noChangeShapeType="1" noTextEdit="1"/>
+          </p:cNvSpPr>
+          <p:nvPr>
+            <p:extLst>
+              <p:ext uri="{386F3935-93C4-4BCD-93E2-E3B085C9AB24}">
+                <p16:designElem xmlns:p16="http://schemas.microsoft.com/office/powerpoint/2015/main" xmlns="" val="1"/>
+              </p:ext>
+            </p:extLst>
+          </p:nvPr>
+        </p:nvSpPr>
+        <p:spPr>
+          <a:xfrm>
+            <a:off x="11005550" y="4112081"/>
+            <a:ext cx="1186451" cy="1771650"/>
+          </a:xfrm>
+          <a:custGeom>
+            <a:avLst/>
+            <a:gdLst>
+              <a:gd name="connsiteX0" fmla="*/ 61913 w 1186451"/>
+              <a:gd name="connsiteY0" fmla="*/ 0 h 1771650"/>
+              <a:gd name="connsiteX1" fmla="*/ 1186451 w 1186451"/>
+              <a:gd name="connsiteY1" fmla="*/ 0 h 1771650"/>
+              <a:gd name="connsiteX2" fmla="*/ 1186451 w 1186451"/>
+              <a:gd name="connsiteY2" fmla="*/ 123825 h 1771650"/>
+              <a:gd name="connsiteX3" fmla="*/ 123825 w 1186451"/>
+              <a:gd name="connsiteY3" fmla="*/ 123825 h 1771650"/>
+              <a:gd name="connsiteX4" fmla="*/ 123825 w 1186451"/>
+              <a:gd name="connsiteY4" fmla="*/ 1647825 h 1771650"/>
+              <a:gd name="connsiteX5" fmla="*/ 1186451 w 1186451"/>
+              <a:gd name="connsiteY5" fmla="*/ 1647825 h 1771650"/>
+              <a:gd name="connsiteX6" fmla="*/ 1186451 w 1186451"/>
+              <a:gd name="connsiteY6" fmla="*/ 1771650 h 1771650"/>
+              <a:gd name="connsiteX7" fmla="*/ 61913 w 1186451"/>
+              <a:gd name="connsiteY7" fmla="*/ 1771650 h 1771650"/>
+              <a:gd name="connsiteX8" fmla="*/ 0 w 1186451"/>
+              <a:gd name="connsiteY8" fmla="*/ 1709738 h 1771650"/>
+              <a:gd name="connsiteX9" fmla="*/ 0 w 1186451"/>
+              <a:gd name="connsiteY9" fmla="*/ 61913 h 1771650"/>
+              <a:gd name="connsiteX10" fmla="*/ 61913 w 1186451"/>
+              <a:gd name="connsiteY10" fmla="*/ 0 h 1771650"/>
+            </a:gdLst>
+            <a:ahLst/>
+            <a:cxnLst>
+              <a:cxn ang="0">
+                <a:pos x="connsiteX0" y="connsiteY0"/>
+              </a:cxn>
+              <a:cxn ang="0">
+                <a:pos x="connsiteX1" y="connsiteY1"/>
+              </a:cxn>
+              <a:cxn ang="0">
+                <a:pos x="connsiteX2" y="connsiteY2"/>
+              </a:cxn>
+              <a:cxn ang="0">
+                <a:pos x="connsiteX3" y="connsiteY3"/>
+              </a:cxn>
+              <a:cxn ang="0">
+                <a:pos x="connsiteX4" y="connsiteY4"/>
+              </a:cxn>
+              <a:cxn ang="0">
+                <a:pos x="connsiteX5" y="connsiteY5"/>
+              </a:cxn>
+              <a:cxn ang="0">
+                <a:pos x="connsiteX6" y="connsiteY6"/>
+              </a:cxn>
+              <a:cxn ang="0">
+                <a:pos x="connsiteX7" y="connsiteY7"/>
+              </a:cxn>
+              <a:cxn ang="0">
+                <a:pos x="connsiteX8" y="connsiteY8"/>
+              </a:cxn>
+              <a:cxn ang="0">
+                <a:pos x="connsiteX9" y="connsiteY9"/>
+              </a:cxn>
+              <a:cxn ang="0">
+                <a:pos x="connsiteX10" y="connsiteY10"/>
+              </a:cxn>
+            </a:cxnLst>
+            <a:rect l="l" t="t" r="r" b="b"/>
+            <a:pathLst>
+              <a:path w="1186451" h="1771650">
+                <a:moveTo>
+                  <a:pt x="61913" y="0"/>
+                </a:moveTo>
+                <a:lnTo>
+                  <a:pt x="1186451" y="0"/>
+                </a:lnTo>
+                <a:lnTo>
+                  <a:pt x="1186451" y="123825"/>
+                </a:lnTo>
+                <a:lnTo>
+                  <a:pt x="123825" y="123825"/>
+                </a:lnTo>
+                <a:lnTo>
+                  <a:pt x="123825" y="1647825"/>
+                </a:lnTo>
+                <a:lnTo>
+                  <a:pt x="1186451" y="1647825"/>
+                </a:lnTo>
+                <a:lnTo>
+                  <a:pt x="1186451" y="1771650"/>
+                </a:lnTo>
+                <a:lnTo>
+                  <a:pt x="61913" y="1771650"/>
+                </a:lnTo>
+                <a:cubicBezTo>
+                  <a:pt x="27719" y="1771650"/>
+                  <a:pt x="0" y="1743932"/>
+                  <a:pt x="0" y="1709738"/>
+                </a:cubicBezTo>
+                <a:lnTo>
+                  <a:pt x="0" y="61913"/>
+                </a:lnTo>
+                <a:cubicBezTo>
+                  <a:pt x="0" y="27719"/>
+                  <a:pt x="27719" y="0"/>
+                  <a:pt x="61913" y="0"/>
+                </a:cubicBezTo>
+                <a:close/>
+              </a:path>
+            </a:pathLst>
+          </a:custGeom>
+          <a:solidFill>
+            <a:schemeClr val="accent6"/>
+          </a:solidFill>
+          <a:ln w="9525" cap="flat">
+            <a:noFill/>
+            <a:prstDash val="solid"/>
+            <a:miter/>
+          </a:ln>
+        </p:spPr>
+        <p:txBody>
+          <a:bodyPr rtlCol="0" anchor="ctr"/>
+          <a:lstStyle/>
+          <a:p>
+            <a:endParaRPr lang="en-US"/>
+          </a:p>
+        </p:txBody>
+      </p:sp>
+      <p:sp>
+        <p:nvSpPr>
+          <p:cNvPr id="22" name="Arc 21">
+            <a:extLst>
+              <a:ext uri="{FF2B5EF4-FFF2-40B4-BE49-F238E27FC236}">
+                <a16:creationId xmlns:a16="http://schemas.microsoft.com/office/drawing/2014/main" xmlns="" id="{EFE5CE34-4543-42E5-B82C-1F3D12422CDD}"/>
+              </a:ext>
+              <a:ext uri="{C183D7F6-B498-43B3-948B-1728B52AA6E4}">
+                <adec:decorative xmlns:adec="http://schemas.microsoft.com/office/drawing/2017/decorative" xmlns="" val="1"/>
+              </a:ext>
+            </a:extLst>
+          </p:cNvPr>
+          <p:cNvSpPr>
+            <a:spLocks noGrp="1" noRot="1" noChangeAspect="1" noMove="1" noResize="1" noEditPoints="1" noAdjustHandles="1" noChangeArrowheads="1" noChangeShapeType="1" noTextEdit="1"/>
+          </p:cNvSpPr>
+          <p:nvPr>
+            <p:extLst>
+              <p:ext uri="{386F3935-93C4-4BCD-93E2-E3B085C9AB24}">
+                <p16:designElem xmlns:p16="http://schemas.microsoft.com/office/powerpoint/2015/main" xmlns="" val="1"/>
+              </p:ext>
+            </p:extLst>
+          </p:nvPr>
+        </p:nvSpPr>
+        <p:spPr>
+          <a:xfrm rot="20992895">
+            <a:off x="6086940" y="4145122"/>
+            <a:ext cx="4083433" cy="4083433"/>
+          </a:xfrm>
+          <a:prstGeom prst="arc">
+            <a:avLst/>
+          </a:prstGeom>
+          <a:ln w="127000" cap="rnd">
+            <a:solidFill>
+              <a:schemeClr val="accent4"/>
+            </a:solidFill>
+            <a:prstDash val="dash"/>
+          </a:ln>
+        </p:spPr>
+        <p:style>
+          <a:lnRef idx="1">
+            <a:schemeClr val="accent1"/>
+          </a:lnRef>
+          <a:fillRef idx="0">
+            <a:schemeClr val="accent1"/>
+          </a:fillRef>
+          <a:effectRef idx="0">
+            <a:schemeClr val="accent1"/>
+          </a:effectRef>
+          <a:fontRef idx="minor">
+            <a:schemeClr val="tx1"/>
+          </a:fontRef>
+        </p:style>
+        <p:txBody>
+          <a:bodyPr rtlCol="0" anchor="ctr"/>
+          <a:lstStyle/>
+          <a:p>
+            <a:pPr algn="ctr"/>
+            <a:endParaRPr lang="en-US" dirty="0"/>
+          </a:p>
+        </p:txBody>
+      </p:sp>
+      <p:sp>
+        <p:nvSpPr>
+          <p:cNvPr id="24" name="Freeform: Shape 23">
+            <a:extLst>
+              <a:ext uri="{FF2B5EF4-FFF2-40B4-BE49-F238E27FC236}">
+                <a16:creationId xmlns:a16="http://schemas.microsoft.com/office/drawing/2014/main" xmlns="" id="{72AF41FE-63D7-4695-81D2-66D2510E4486}"/>
+              </a:ext>
+              <a:ext uri="{C183D7F6-B498-43B3-948B-1728B52AA6E4}">
+                <adec:decorative xmlns:adec="http://schemas.microsoft.com/office/drawing/2017/decorative" xmlns="" val="1"/>
+              </a:ext>
+            </a:extLst>
+          </p:cNvPr>
+          <p:cNvSpPr>
+            <a:spLocks noGrp="1" noRot="1" noChangeAspect="1" noMove="1" noResize="1" noEditPoints="1" noAdjustHandles="1" noChangeArrowheads="1" noChangeShapeType="1" noTextEdit="1"/>
+          </p:cNvSpPr>
+          <p:nvPr>
+            <p:extLst>
+              <p:ext uri="{386F3935-93C4-4BCD-93E2-E3B085C9AB24}">
+                <p16:designElem xmlns:p16="http://schemas.microsoft.com/office/powerpoint/2015/main" xmlns="" val="1"/>
+              </p:ext>
+            </p:extLst>
+          </p:nvPr>
+        </p:nvSpPr>
+        <p:spPr>
+          <a:xfrm>
+            <a:off x="6821310" y="4962670"/>
+            <a:ext cx="2643352" cy="1895331"/>
+          </a:xfrm>
+          <a:custGeom>
+            <a:avLst/>
+            <a:gdLst>
+              <a:gd name="connsiteX0" fmla="*/ 1321676 w 2643352"/>
+              <a:gd name="connsiteY0" fmla="*/ 0 h 1895331"/>
+              <a:gd name="connsiteX1" fmla="*/ 2643352 w 2643352"/>
+              <a:gd name="connsiteY1" fmla="*/ 1321676 h 1895331"/>
+              <a:gd name="connsiteX2" fmla="*/ 2539488 w 2643352"/>
+              <a:gd name="connsiteY2" fmla="*/ 1836132 h 1895331"/>
+              <a:gd name="connsiteX3" fmla="*/ 2510970 w 2643352"/>
+              <a:gd name="connsiteY3" fmla="*/ 1895331 h 1895331"/>
+              <a:gd name="connsiteX4" fmla="*/ 132382 w 2643352"/>
+              <a:gd name="connsiteY4" fmla="*/ 1895331 h 1895331"/>
+              <a:gd name="connsiteX5" fmla="*/ 103864 w 2643352"/>
+              <a:gd name="connsiteY5" fmla="*/ 1836132 h 1895331"/>
+              <a:gd name="connsiteX6" fmla="*/ 0 w 2643352"/>
+              <a:gd name="connsiteY6" fmla="*/ 1321676 h 1895331"/>
+              <a:gd name="connsiteX7" fmla="*/ 1321676 w 2643352"/>
+              <a:gd name="connsiteY7" fmla="*/ 0 h 1895331"/>
+            </a:gdLst>
+            <a:ahLst/>
+            <a:cxnLst>
+              <a:cxn ang="0">
+                <a:pos x="connsiteX0" y="connsiteY0"/>
+              </a:cxn>
+              <a:cxn ang="0">
+                <a:pos x="connsiteX1" y="connsiteY1"/>
+              </a:cxn>
+              <a:cxn ang="0">
+                <a:pos x="connsiteX2" y="connsiteY2"/>
+              </a:cxn>
+              <a:cxn ang="0">
+                <a:pos x="connsiteX3" y="connsiteY3"/>
+              </a:cxn>
+              <a:cxn ang="0">
+                <a:pos x="connsiteX4" y="connsiteY4"/>
+              </a:cxn>
+              <a:cxn ang="0">
+                <a:pos x="connsiteX5" y="connsiteY5"/>
+              </a:cxn>
+              <a:cxn ang="0">
+                <a:pos x="connsiteX6" y="connsiteY6"/>
+              </a:cxn>
+              <a:cxn ang="0">
+                <a:pos x="connsiteX7" y="connsiteY7"/>
+              </a:cxn>
+            </a:cxnLst>
+            <a:rect l="l" t="t" r="r" b="b"/>
+            <a:pathLst>
+              <a:path w="2643352" h="1895331">
+                <a:moveTo>
+                  <a:pt x="1321676" y="0"/>
+                </a:moveTo>
+                <a:cubicBezTo>
+                  <a:pt x="2051617" y="0"/>
+                  <a:pt x="2643352" y="591735"/>
+                  <a:pt x="2643352" y="1321676"/>
+                </a:cubicBezTo>
+                <a:cubicBezTo>
+                  <a:pt x="2643352" y="1504161"/>
+                  <a:pt x="2606369" y="1678009"/>
+                  <a:pt x="2539488" y="1836132"/>
+                </a:cubicBezTo>
+                <a:lnTo>
+                  <a:pt x="2510970" y="1895331"/>
+                </a:lnTo>
+                <a:lnTo>
+                  <a:pt x="132382" y="1895331"/>
+                </a:lnTo>
+                <a:lnTo>
+                  <a:pt x="103864" y="1836132"/>
+                </a:lnTo>
+                <a:cubicBezTo>
+                  <a:pt x="36984" y="1678009"/>
+                  <a:pt x="0" y="1504161"/>
+                  <a:pt x="0" y="1321676"/>
+                </a:cubicBezTo>
+                <a:cubicBezTo>
+                  <a:pt x="0" y="591735"/>
+                  <a:pt x="591735" y="0"/>
+                  <a:pt x="1321676" y="0"/>
+                </a:cubicBezTo>
+                <a:close/>
+              </a:path>
+            </a:pathLst>
+          </a:custGeom>
+          <a:solidFill>
+            <a:schemeClr val="accent2"/>
+          </a:solidFill>
+          <a:ln>
+            <a:noFill/>
+          </a:ln>
+        </p:spPr>
+        <p:style>
+          <a:lnRef idx="2">
+            <a:schemeClr val="accent1">
+              <a:shade val="50000"/>
+            </a:schemeClr>
+          </a:lnRef>
+          <a:fillRef idx="1">
+            <a:schemeClr val="accent1"/>
+          </a:fillRef>
+          <a:effectRef idx="0">
+            <a:schemeClr val="accent1"/>
+          </a:effectRef>
+          <a:fontRef idx="minor">
+            <a:schemeClr val="lt1"/>
+          </a:fontRef>
+        </p:style>
+        <p:txBody>
+          <a:bodyPr rtlCol="0" anchor="ctr"/>
+          <a:lstStyle/>
+          <a:p>
+            <a:pPr algn="ctr"/>
+            <a:endParaRPr lang="en-US"/>
+          </a:p>
+        </p:txBody>
+      </p:sp>
+      <p:sp>
+        <p:nvSpPr>
+          <p:cNvPr id="3" name="CuadroTexto 2">
+            <a:extLst>
+              <a:ext uri="{FF2B5EF4-FFF2-40B4-BE49-F238E27FC236}">
+                <a16:creationId xmlns:a16="http://schemas.microsoft.com/office/drawing/2014/main" xmlns="" id="{726ED1DE-CB01-4832-9ECC-A868EB41CFB1}"/>
+              </a:ext>
+            </a:extLst>
+          </p:cNvPr>
+          <p:cNvSpPr txBox="1"/>
+          <p:nvPr/>
+        </p:nvSpPr>
+        <p:spPr>
+          <a:xfrm>
+            <a:off x="526211" y="3171646"/>
+            <a:ext cx="5057954" cy="2308324"/>
+          </a:xfrm>
+          <a:prstGeom prst="rect">
+            <a:avLst/>
+          </a:prstGeom>
+          <a:noFill/>
+        </p:spPr>
+        <p:txBody>
+          <a:bodyPr rot="0" spcFirstLastPara="0" vertOverflow="overflow" horzOverflow="overflow" vert="horz" wrap="square" lIns="91440" tIns="45720" rIns="91440" bIns="45720" numCol="1" spcCol="0" rtlCol="0" fromWordArt="0" anchor="t" anchorCtr="0" forceAA="0" compatLnSpc="1">
+            <a:prstTxWarp prst="textNoShape">
+              <a:avLst/>
+            </a:prstTxWarp>
+            <a:spAutoFit/>
+          </a:bodyPr>
+          <a:lstStyle/>
+          <a:p>
+            <a:pPr algn="just"/>
+            <a:r>
+              <a:rPr lang="es-ES" sz="2400"/>
+              <a:t>As primary keys e as foreign keys tem objetivos distintos, normalmente você sempre vai querer ter uma primary key em todas as suas tabelas. Em banco de dados este é um requisito para normalização de tabelas.</a:t>
+            </a:r>
+            <a:endParaRPr lang="es-ES"/>
+          </a:p>
+        </p:txBody>
+      </p:sp>
+    </p:spTree>
+    <p:extLst>
+      <p:ext uri="{BB962C8B-B14F-4D97-AF65-F5344CB8AC3E}">
+        <p14:creationId xmlns:p14="http://schemas.microsoft.com/office/powerpoint/2010/main" val="874345705"/>
+      </p:ext>
+    </p:extLst>
+  </p:cSld>
+  <p:clrMapOvr>
+    <a:masterClrMapping/>
+  </p:clrMapOvr>
+</p:sld>
+</file>
+
+<file path=ppt/slides/slide15.xml><?xml version="1.0" encoding="utf-8"?>
+<p:sld xmlns:a="http://schemas.openxmlformats.org/drawingml/2006/main" xmlns:r="http://schemas.openxmlformats.org/officeDocument/2006/relationships" xmlns:p="http://schemas.openxmlformats.org/presentationml/2006/main">
+  <p:cSld>
+    <p:bg>
+      <p:bgPr>
+        <a:solidFill>
+          <a:schemeClr val="bg1"/>
+        </a:solidFill>
+        <a:effectLst/>
+      </p:bgPr>
+    </p:bg>
+    <p:spTree>
+      <p:nvGrpSpPr>
+        <p:cNvPr id="1" name=""/>
+        <p:cNvGrpSpPr/>
+        <p:nvPr/>
+      </p:nvGrpSpPr>
+      <p:grpSpPr>
+        <a:xfrm>
+          <a:off x="0" y="0"/>
+          <a:ext cx="0" cy="0"/>
+          <a:chOff x="0" y="0"/>
+          <a:chExt cx="0" cy="0"/>
+        </a:xfrm>
+      </p:grpSpPr>
+      <p:sp useBgFill="1">
+        <p:nvSpPr>
+          <p:cNvPr id="8" name="Rectangle 7">
+            <a:extLst>
+              <a:ext uri="{FF2B5EF4-FFF2-40B4-BE49-F238E27FC236}">
+                <a16:creationId xmlns:a16="http://schemas.microsoft.com/office/drawing/2014/main" xmlns="" id="{389575E1-3389-451A-A5F7-27854C25C599}"/>
+              </a:ext>
+              <a:ext uri="{C183D7F6-B498-43B3-948B-1728B52AA6E4}">
+                <adec:decorative xmlns:adec="http://schemas.microsoft.com/office/drawing/2017/decorative" xmlns="" val="1"/>
+              </a:ext>
+            </a:extLst>
+          </p:cNvPr>
+          <p:cNvSpPr>
+            <a:spLocks noGrp="1" noRot="1" noChangeAspect="1" noMove="1" noResize="1" noEditPoints="1" noAdjustHandles="1" noChangeArrowheads="1" noChangeShapeType="1" noTextEdit="1"/>
+          </p:cNvSpPr>
+          <p:nvPr>
+            <p:extLst>
+              <p:ext uri="{386F3935-93C4-4BCD-93E2-E3B085C9AB24}">
+                <p16:designElem xmlns:p16="http://schemas.microsoft.com/office/powerpoint/2015/main" xmlns="" val="1"/>
+              </p:ext>
+            </p:extLst>
+          </p:nvPr>
+        </p:nvSpPr>
+        <p:spPr>
+          <a:xfrm>
+            <a:off x="3048" y="4293"/>
+            <a:ext cx="12188952" cy="6858000"/>
+          </a:xfrm>
+          <a:prstGeom prst="rect">
+            <a:avLst/>
+          </a:prstGeom>
+          <a:ln>
+            <a:noFill/>
+          </a:ln>
+        </p:spPr>
+        <p:style>
+          <a:lnRef idx="2">
+            <a:schemeClr val="accent1">
+              <a:shade val="50000"/>
+            </a:schemeClr>
+          </a:lnRef>
+          <a:fillRef idx="1">
+            <a:schemeClr val="accent1"/>
+          </a:fillRef>
+          <a:effectRef idx="0">
+            <a:schemeClr val="accent1"/>
+          </a:effectRef>
+          <a:fontRef idx="minor">
+            <a:schemeClr val="lt1"/>
+          </a:fontRef>
+        </p:style>
+        <p:txBody>
+          <a:bodyPr rtlCol="0" anchor="ctr"/>
+          <a:lstStyle/>
+          <a:p>
+            <a:pPr algn="ctr"/>
+            <a:endParaRPr lang="en-US"/>
+          </a:p>
+        </p:txBody>
+      </p:sp>
+      <p:sp>
+        <p:nvSpPr>
+          <p:cNvPr id="10" name="Rectangle 9">
+            <a:extLst>
+              <a:ext uri="{FF2B5EF4-FFF2-40B4-BE49-F238E27FC236}">
+                <a16:creationId xmlns:a16="http://schemas.microsoft.com/office/drawing/2014/main" xmlns="" id="{A53CCC5C-D88E-40FB-B30B-23DCDBD01D37}"/>
+              </a:ext>
+              <a:ext uri="{C183D7F6-B498-43B3-948B-1728B52AA6E4}">
+                <adec:decorative xmlns:adec="http://schemas.microsoft.com/office/drawing/2017/decorative" xmlns="" val="1"/>
+              </a:ext>
+            </a:extLst>
+          </p:cNvPr>
+          <p:cNvSpPr>
+            <a:spLocks noGrp="1" noRot="1" noChangeAspect="1" noMove="1" noResize="1" noEditPoints="1" noAdjustHandles="1" noChangeArrowheads="1" noChangeShapeType="1" noTextEdit="1"/>
+          </p:cNvSpPr>
+          <p:nvPr>
+            <p:extLst>
+              <p:ext uri="{386F3935-93C4-4BCD-93E2-E3B085C9AB24}">
+                <p16:designElem xmlns:p16="http://schemas.microsoft.com/office/powerpoint/2015/main" xmlns="" val="1"/>
+              </p:ext>
+            </p:extLst>
+          </p:nvPr>
+        </p:nvSpPr>
+        <p:spPr>
+          <a:xfrm>
+            <a:off x="0" y="-4"/>
+            <a:ext cx="4167268" cy="6858004"/>
+          </a:xfrm>
+          <a:prstGeom prst="rect">
+            <a:avLst/>
+          </a:prstGeom>
+          <a:solidFill>
+            <a:schemeClr val="accent2"/>
+          </a:solidFill>
+          <a:ln>
+            <a:noFill/>
+          </a:ln>
+        </p:spPr>
+        <p:style>
+          <a:lnRef idx="2">
+            <a:schemeClr val="accent1">
+              <a:shade val="50000"/>
+            </a:schemeClr>
+          </a:lnRef>
+          <a:fillRef idx="1">
+            <a:schemeClr val="accent1"/>
+          </a:fillRef>
+          <a:effectRef idx="0">
+            <a:schemeClr val="accent1"/>
+          </a:effectRef>
+          <a:fontRef idx="minor">
+            <a:schemeClr val="lt1"/>
+          </a:fontRef>
+        </p:style>
+        <p:txBody>
+          <a:bodyPr rtlCol="0" anchor="ctr"/>
+          <a:lstStyle/>
+          <a:p>
+            <a:pPr algn="ctr"/>
+            <a:endParaRPr lang="en-US"/>
+          </a:p>
+        </p:txBody>
+      </p:sp>
+      <p:sp>
+        <p:nvSpPr>
+          <p:cNvPr id="2" name="Título 1">
+            <a:extLst>
+              <a:ext uri="{FF2B5EF4-FFF2-40B4-BE49-F238E27FC236}">
+                <a16:creationId xmlns:a16="http://schemas.microsoft.com/office/drawing/2014/main" xmlns="" id="{16C8E690-636C-4DCC-9DE1-22C0091FA7A7}"/>
+              </a:ext>
+            </a:extLst>
+          </p:cNvPr>
+          <p:cNvSpPr>
+            <a:spLocks noGrp="1"/>
+          </p:cNvSpPr>
+          <p:nvPr>
+            <p:ph type="title"/>
+          </p:nvPr>
+        </p:nvSpPr>
+        <p:spPr>
+          <a:xfrm>
+            <a:off x="485551" y="634476"/>
+            <a:ext cx="3200400" cy="5585619"/>
+          </a:xfrm>
+        </p:spPr>
+        <p:txBody>
+          <a:bodyPr>
+            <a:normAutofit/>
+          </a:bodyPr>
+          <a:lstStyle/>
+          <a:p>
+            <a:pPr algn="ctr"/>
+            <a:r>
+              <a:rPr lang="es-ES">
+                <a:solidFill>
+                  <a:srgbClr val="FFFFFF"/>
+                </a:solidFill>
+                <a:cs typeface="Calibri Light"/>
+              </a:rPr>
+              <a:t>Primary Key</a:t>
+            </a:r>
+            <a:endParaRPr lang="es-ES">
+              <a:cs typeface="Calibri Light" panose="020F0302020204030204"/>
+            </a:endParaRPr>
+          </a:p>
+        </p:txBody>
+      </p:sp>
+      <p:sp>
+        <p:nvSpPr>
+          <p:cNvPr id="12" name="Arc 11">
+            <a:extLst>
+              <a:ext uri="{FF2B5EF4-FFF2-40B4-BE49-F238E27FC236}">
+                <a16:creationId xmlns:a16="http://schemas.microsoft.com/office/drawing/2014/main" xmlns="" id="{081E4A58-353D-44AE-B2FC-2A74E2E400F7}"/>
+              </a:ext>
+              <a:ext uri="{C183D7F6-B498-43B3-948B-1728B52AA6E4}">
+                <adec:decorative xmlns:adec="http://schemas.microsoft.com/office/drawing/2017/decorative" xmlns="" val="1"/>
+              </a:ext>
+            </a:extLst>
+          </p:cNvPr>
+          <p:cNvSpPr>
+            <a:spLocks noGrp="1" noRot="1" noChangeAspect="1" noMove="1" noResize="1" noEditPoints="1" noAdjustHandles="1" noChangeArrowheads="1" noChangeShapeType="1" noTextEdit="1"/>
+          </p:cNvSpPr>
+          <p:nvPr>
+            <p:extLst>
+              <p:ext uri="{386F3935-93C4-4BCD-93E2-E3B085C9AB24}">
+                <p16:designElem xmlns:p16="http://schemas.microsoft.com/office/powerpoint/2015/main" xmlns="" val="1"/>
+              </p:ext>
+            </p:extLst>
+          </p:nvPr>
+        </p:nvSpPr>
+        <p:spPr>
+          <a:xfrm flipV="1">
+            <a:off x="7550402" y="2455479"/>
+            <a:ext cx="4083433" cy="4083433"/>
+          </a:xfrm>
+          <a:prstGeom prst="arc">
+            <a:avLst/>
+          </a:prstGeom>
+          <a:ln w="127000" cap="rnd">
+            <a:solidFill>
+              <a:schemeClr val="accent4"/>
+            </a:solidFill>
+            <a:prstDash val="dash"/>
+          </a:ln>
+        </p:spPr>
+        <p:style>
+          <a:lnRef idx="1">
+            <a:schemeClr val="accent1"/>
+          </a:lnRef>
+          <a:fillRef idx="0">
+            <a:schemeClr val="accent1"/>
+          </a:fillRef>
+          <a:effectRef idx="0">
+            <a:schemeClr val="accent1"/>
+          </a:effectRef>
+          <a:fontRef idx="minor">
+            <a:schemeClr val="tx1"/>
+          </a:fontRef>
+        </p:style>
+        <p:txBody>
+          <a:bodyPr rtlCol="0" anchor="ctr"/>
+          <a:lstStyle/>
+          <a:p>
+            <a:pPr algn="ctr"/>
+            <a:endParaRPr lang="en-US" dirty="0"/>
+          </a:p>
+        </p:txBody>
+      </p:sp>
+      <p:sp>
+        <p:nvSpPr>
+          <p:cNvPr id="3" name="Subtítulo 2">
+            <a:extLst>
+              <a:ext uri="{FF2B5EF4-FFF2-40B4-BE49-F238E27FC236}">
+                <a16:creationId xmlns:a16="http://schemas.microsoft.com/office/drawing/2014/main" xmlns="" id="{5CF9D76E-8640-4F17-BB13-0651BC0F1227}"/>
+              </a:ext>
+            </a:extLst>
+          </p:cNvPr>
+          <p:cNvSpPr>
+            <a:spLocks noGrp="1"/>
+          </p:cNvSpPr>
+          <p:nvPr>
+            <p:ph idx="1"/>
+          </p:nvPr>
+        </p:nvSpPr>
+        <p:spPr>
+          <a:xfrm>
+            <a:off x="4447308" y="591344"/>
+            <a:ext cx="6906491" cy="5585619"/>
+          </a:xfrm>
+        </p:spPr>
+        <p:txBody>
+          <a:bodyPr anchor="ctr">
+            <a:normAutofit/>
+          </a:bodyPr>
+          <a:lstStyle/>
+          <a:p>
+            <a:endParaRPr lang="es-ES" dirty="0">
+              <a:ea typeface="+mn-lt"/>
+              <a:cs typeface="+mn-lt"/>
+            </a:endParaRPr>
+          </a:p>
+          <a:p>
+            <a:r>
+              <a:rPr lang="es-ES">
+                <a:ea typeface="+mn-lt"/>
+                <a:cs typeface="+mn-lt"/>
+              </a:rPr>
+              <a:t>O objetivo de uma </a:t>
+            </a:r>
+            <a:r>
+              <a:rPr lang="es-ES">
+                <a:latin typeface="Calibri"/>
+                <a:cs typeface="Calibri"/>
+              </a:rPr>
+              <a:t>primary key</a:t>
+            </a:r>
+            <a:r>
+              <a:rPr lang="es-ES">
+                <a:ea typeface="+mn-lt"/>
+                <a:cs typeface="+mn-lt"/>
+              </a:rPr>
+              <a:t> é permitir identificar o registro de forma única, não existe outra </a:t>
+            </a:r>
+            <a:r>
+              <a:rPr lang="es-ES">
+                <a:latin typeface="Calibri"/>
+                <a:cs typeface="Calibri"/>
+              </a:rPr>
+              <a:t>primary key</a:t>
+            </a:r>
+            <a:r>
+              <a:rPr lang="es-ES">
+                <a:ea typeface="+mn-lt"/>
+                <a:cs typeface="+mn-lt"/>
+              </a:rPr>
+              <a:t> para este mesmo registro da mesma forma que nenhum outro registro possui esta </a:t>
+            </a:r>
+            <a:r>
+              <a:rPr lang="es-ES">
+                <a:latin typeface="Calibri"/>
+                <a:cs typeface="Calibri"/>
+              </a:rPr>
+              <a:t>primary key</a:t>
+            </a:r>
+            <a:r>
+              <a:rPr lang="es-ES">
+                <a:ea typeface="+mn-lt"/>
+                <a:cs typeface="+mn-lt"/>
+              </a:rPr>
+              <a:t>, isso permite que você garanta que aquilo que está sendo selecionado está correto.</a:t>
+            </a:r>
+            <a:endParaRPr lang="es-ES" dirty="0">
+              <a:cs typeface="Calibri"/>
+            </a:endParaRPr>
+          </a:p>
+        </p:txBody>
+      </p:sp>
+    </p:spTree>
+    <p:extLst>
+      <p:ext uri="{BB962C8B-B14F-4D97-AF65-F5344CB8AC3E}">
+        <p14:creationId xmlns:p14="http://schemas.microsoft.com/office/powerpoint/2010/main" val="483040757"/>
+      </p:ext>
+    </p:extLst>
+  </p:cSld>
+  <p:clrMapOvr>
+    <a:masterClrMapping/>
+  </p:clrMapOvr>
+</p:sld>
+</file>
+
+<file path=ppt/slides/slide16.xml><?xml version="1.0" encoding="utf-8"?>
+<p:sld xmlns:a="http://schemas.openxmlformats.org/drawingml/2006/main" xmlns:r="http://schemas.openxmlformats.org/officeDocument/2006/relationships" xmlns:p="http://schemas.openxmlformats.org/presentationml/2006/main">
+  <p:cSld>
+    <p:bg>
+      <p:bgPr>
+        <a:solidFill>
+          <a:schemeClr val="bg1"/>
+        </a:solidFill>
+        <a:effectLst/>
+      </p:bgPr>
+    </p:bg>
+    <p:spTree>
+      <p:nvGrpSpPr>
+        <p:cNvPr id="1" name=""/>
+        <p:cNvGrpSpPr/>
+        <p:nvPr/>
+      </p:nvGrpSpPr>
+      <p:grpSpPr>
+        <a:xfrm>
+          <a:off x="0" y="0"/>
+          <a:ext cx="0" cy="0"/>
+          <a:chOff x="0" y="0"/>
+          <a:chExt cx="0" cy="0"/>
+        </a:xfrm>
+      </p:grpSpPr>
+      <p:sp useBgFill="1">
+        <p:nvSpPr>
+          <p:cNvPr id="8" name="Rectangle 7">
+            <a:extLst>
+              <a:ext uri="{FF2B5EF4-FFF2-40B4-BE49-F238E27FC236}">
+                <a16:creationId xmlns:a16="http://schemas.microsoft.com/office/drawing/2014/main" xmlns="" id="{389575E1-3389-451A-A5F7-27854C25C599}"/>
+              </a:ext>
+              <a:ext uri="{C183D7F6-B498-43B3-948B-1728B52AA6E4}">
+                <adec:decorative xmlns:adec="http://schemas.microsoft.com/office/drawing/2017/decorative" xmlns="" val="1"/>
+              </a:ext>
+            </a:extLst>
+          </p:cNvPr>
+          <p:cNvSpPr>
+            <a:spLocks noGrp="1" noRot="1" noChangeAspect="1" noMove="1" noResize="1" noEditPoints="1" noAdjustHandles="1" noChangeArrowheads="1" noChangeShapeType="1" noTextEdit="1"/>
+          </p:cNvSpPr>
+          <p:nvPr>
+            <p:extLst>
+              <p:ext uri="{386F3935-93C4-4BCD-93E2-E3B085C9AB24}">
+                <p16:designElem xmlns:p16="http://schemas.microsoft.com/office/powerpoint/2015/main" xmlns="" val="1"/>
+              </p:ext>
+            </p:extLst>
+          </p:nvPr>
+        </p:nvSpPr>
+        <p:spPr>
+          <a:xfrm>
+            <a:off x="3048" y="4293"/>
+            <a:ext cx="12188952" cy="6858000"/>
+          </a:xfrm>
+          <a:prstGeom prst="rect">
+            <a:avLst/>
+          </a:prstGeom>
+          <a:ln>
+            <a:noFill/>
+          </a:ln>
+        </p:spPr>
+        <p:style>
+          <a:lnRef idx="2">
+            <a:schemeClr val="accent1">
+              <a:shade val="50000"/>
+            </a:schemeClr>
+          </a:lnRef>
+          <a:fillRef idx="1">
+            <a:schemeClr val="accent1"/>
+          </a:fillRef>
+          <a:effectRef idx="0">
+            <a:schemeClr val="accent1"/>
+          </a:effectRef>
+          <a:fontRef idx="minor">
+            <a:schemeClr val="lt1"/>
+          </a:fontRef>
+        </p:style>
+        <p:txBody>
+          <a:bodyPr rtlCol="0" anchor="ctr"/>
+          <a:lstStyle/>
+          <a:p>
+            <a:pPr algn="ctr"/>
+            <a:endParaRPr lang="en-US"/>
+          </a:p>
+        </p:txBody>
+      </p:sp>
+      <p:sp>
+        <p:nvSpPr>
+          <p:cNvPr id="10" name="Rectangle 9">
+            <a:extLst>
+              <a:ext uri="{FF2B5EF4-FFF2-40B4-BE49-F238E27FC236}">
+                <a16:creationId xmlns:a16="http://schemas.microsoft.com/office/drawing/2014/main" xmlns="" id="{A53CCC5C-D88E-40FB-B30B-23DCDBD01D37}"/>
+              </a:ext>
+              <a:ext uri="{C183D7F6-B498-43B3-948B-1728B52AA6E4}">
+                <adec:decorative xmlns:adec="http://schemas.microsoft.com/office/drawing/2017/decorative" xmlns="" val="1"/>
+              </a:ext>
+            </a:extLst>
+          </p:cNvPr>
+          <p:cNvSpPr>
+            <a:spLocks noGrp="1" noRot="1" noChangeAspect="1" noMove="1" noResize="1" noEditPoints="1" noAdjustHandles="1" noChangeArrowheads="1" noChangeShapeType="1" noTextEdit="1"/>
+          </p:cNvSpPr>
+          <p:nvPr>
+            <p:extLst>
+              <p:ext uri="{386F3935-93C4-4BCD-93E2-E3B085C9AB24}">
+                <p16:designElem xmlns:p16="http://schemas.microsoft.com/office/powerpoint/2015/main" xmlns="" val="1"/>
+              </p:ext>
+            </p:extLst>
+          </p:nvPr>
+        </p:nvSpPr>
+        <p:spPr>
+          <a:xfrm>
+            <a:off x="0" y="-4"/>
+            <a:ext cx="4167268" cy="6858004"/>
+          </a:xfrm>
+          <a:prstGeom prst="rect">
+            <a:avLst/>
+          </a:prstGeom>
+          <a:solidFill>
+            <a:schemeClr val="accent2"/>
+          </a:solidFill>
+          <a:ln>
+            <a:noFill/>
+          </a:ln>
+        </p:spPr>
+        <p:style>
+          <a:lnRef idx="2">
+            <a:schemeClr val="accent1">
+              <a:shade val="50000"/>
+            </a:schemeClr>
+          </a:lnRef>
+          <a:fillRef idx="1">
+            <a:schemeClr val="accent1"/>
+          </a:fillRef>
+          <a:effectRef idx="0">
+            <a:schemeClr val="accent1"/>
+          </a:effectRef>
+          <a:fontRef idx="minor">
+            <a:schemeClr val="lt1"/>
+          </a:fontRef>
+        </p:style>
+        <p:txBody>
+          <a:bodyPr rtlCol="0" anchor="ctr"/>
+          <a:lstStyle/>
+          <a:p>
+            <a:pPr algn="ctr"/>
+            <a:endParaRPr lang="en-US"/>
+          </a:p>
+        </p:txBody>
+      </p:sp>
+      <p:sp>
+        <p:nvSpPr>
+          <p:cNvPr id="2" name="Título 1">
+            <a:extLst>
+              <a:ext uri="{FF2B5EF4-FFF2-40B4-BE49-F238E27FC236}">
+                <a16:creationId xmlns:a16="http://schemas.microsoft.com/office/drawing/2014/main" xmlns="" id="{16C8E690-636C-4DCC-9DE1-22C0091FA7A7}"/>
+              </a:ext>
+            </a:extLst>
+          </p:cNvPr>
+          <p:cNvSpPr>
+            <a:spLocks noGrp="1"/>
+          </p:cNvSpPr>
+          <p:nvPr>
+            <p:ph type="title"/>
+          </p:nvPr>
+        </p:nvSpPr>
+        <p:spPr>
+          <a:xfrm>
+            <a:off x="485551" y="634476"/>
+            <a:ext cx="3200400" cy="5585619"/>
+          </a:xfrm>
+        </p:spPr>
+        <p:txBody>
+          <a:bodyPr>
+            <a:normAutofit/>
+          </a:bodyPr>
+          <a:lstStyle/>
+          <a:p>
+            <a:pPr algn="ctr"/>
+            <a:r>
+              <a:rPr lang="es-ES">
+                <a:solidFill>
+                  <a:srgbClr val="FFFFFF"/>
+                </a:solidFill>
+                <a:cs typeface="Calibri Light"/>
+              </a:rPr>
+              <a:t>Foreign Key</a:t>
+            </a:r>
+            <a:endParaRPr lang="es-ES">
+              <a:cs typeface="Calibri Light" panose="020F0302020204030204"/>
+            </a:endParaRPr>
+          </a:p>
+        </p:txBody>
+      </p:sp>
+      <p:sp>
+        <p:nvSpPr>
+          <p:cNvPr id="12" name="Arc 11">
+            <a:extLst>
+              <a:ext uri="{FF2B5EF4-FFF2-40B4-BE49-F238E27FC236}">
+                <a16:creationId xmlns:a16="http://schemas.microsoft.com/office/drawing/2014/main" xmlns="" id="{081E4A58-353D-44AE-B2FC-2A74E2E400F7}"/>
+              </a:ext>
+              <a:ext uri="{C183D7F6-B498-43B3-948B-1728B52AA6E4}">
+                <adec:decorative xmlns:adec="http://schemas.microsoft.com/office/drawing/2017/decorative" xmlns="" val="1"/>
+              </a:ext>
+            </a:extLst>
+          </p:cNvPr>
+          <p:cNvSpPr>
+            <a:spLocks noGrp="1" noRot="1" noChangeAspect="1" noMove="1" noResize="1" noEditPoints="1" noAdjustHandles="1" noChangeArrowheads="1" noChangeShapeType="1" noTextEdit="1"/>
+          </p:cNvSpPr>
+          <p:nvPr>
+            <p:extLst>
+              <p:ext uri="{386F3935-93C4-4BCD-93E2-E3B085C9AB24}">
+                <p16:designElem xmlns:p16="http://schemas.microsoft.com/office/powerpoint/2015/main" xmlns="" val="1"/>
+              </p:ext>
+            </p:extLst>
+          </p:nvPr>
+        </p:nvSpPr>
+        <p:spPr>
+          <a:xfrm flipV="1">
+            <a:off x="7550402" y="2455479"/>
+            <a:ext cx="4083433" cy="4083433"/>
+          </a:xfrm>
+          <a:prstGeom prst="arc">
+            <a:avLst/>
+          </a:prstGeom>
+          <a:ln w="127000" cap="rnd">
+            <a:solidFill>
+              <a:schemeClr val="accent4"/>
+            </a:solidFill>
+            <a:prstDash val="dash"/>
+          </a:ln>
+        </p:spPr>
+        <p:style>
+          <a:lnRef idx="1">
+            <a:schemeClr val="accent1"/>
+          </a:lnRef>
+          <a:fillRef idx="0">
+            <a:schemeClr val="accent1"/>
+          </a:fillRef>
+          <a:effectRef idx="0">
+            <a:schemeClr val="accent1"/>
+          </a:effectRef>
+          <a:fontRef idx="minor">
+            <a:schemeClr val="tx1"/>
+          </a:fontRef>
+        </p:style>
+        <p:txBody>
+          <a:bodyPr rtlCol="0" anchor="ctr"/>
+          <a:lstStyle/>
+          <a:p>
+            <a:pPr algn="ctr"/>
+            <a:endParaRPr lang="en-US" dirty="0"/>
+          </a:p>
+        </p:txBody>
+      </p:sp>
+      <p:sp>
+        <p:nvSpPr>
+          <p:cNvPr id="3" name="Subtítulo 2">
+            <a:extLst>
+              <a:ext uri="{FF2B5EF4-FFF2-40B4-BE49-F238E27FC236}">
+                <a16:creationId xmlns:a16="http://schemas.microsoft.com/office/drawing/2014/main" xmlns="" id="{5CF9D76E-8640-4F17-BB13-0651BC0F1227}"/>
+              </a:ext>
+            </a:extLst>
+          </p:cNvPr>
+          <p:cNvSpPr>
+            <a:spLocks noGrp="1"/>
+          </p:cNvSpPr>
+          <p:nvPr>
+            <p:ph idx="1"/>
+          </p:nvPr>
+        </p:nvSpPr>
+        <p:spPr>
+          <a:xfrm>
+            <a:off x="4648591" y="1899683"/>
+            <a:ext cx="6906491" cy="3558411"/>
+          </a:xfrm>
+        </p:spPr>
+        <p:txBody>
+          <a:bodyPr anchor="ctr">
+            <a:noAutofit/>
+          </a:bodyPr>
+          <a:lstStyle/>
+          <a:p>
+            <a:r>
+              <a:rPr lang="es-ES" sz="3200">
+                <a:ea typeface="+mn-lt"/>
+                <a:cs typeface="+mn-lt"/>
+              </a:rPr>
+              <a:t>As </a:t>
+            </a:r>
+            <a:r>
+              <a:rPr lang="es-ES" sz="3200">
+                <a:latin typeface="Calibri"/>
+                <a:cs typeface="Calibri"/>
+              </a:rPr>
+              <a:t>foreign keys</a:t>
+            </a:r>
+            <a:r>
+              <a:rPr lang="es-ES" sz="3200">
+                <a:ea typeface="+mn-lt"/>
+                <a:cs typeface="+mn-lt"/>
+              </a:rPr>
+              <a:t> tem como principal objetivo manter a consistência, você consegue usando elas garantir que os registros estão referenciando os registros corretos e evitar que novos registros sejam inseridos de forma errônea.</a:t>
+            </a:r>
+            <a:endParaRPr lang="es-ES" sz="3200" dirty="0">
+              <a:cs typeface="Calibri"/>
+            </a:endParaRPr>
+          </a:p>
+        </p:txBody>
+      </p:sp>
+    </p:spTree>
+    <p:extLst>
+      <p:ext uri="{BB962C8B-B14F-4D97-AF65-F5344CB8AC3E}">
+        <p14:creationId xmlns:p14="http://schemas.microsoft.com/office/powerpoint/2010/main" val="2325901013"/>
+      </p:ext>
+    </p:extLst>
+  </p:cSld>
+  <p:clrMapOvr>
+    <a:masterClrMapping/>
+  </p:clrMapOvr>
+</p:sld>
+</file>
+
+<file path=ppt/slides/slide17.xml><?xml version="1.0" encoding="utf-8"?>
+<p:sld xmlns:a="http://schemas.openxmlformats.org/drawingml/2006/main" xmlns:r="http://schemas.openxmlformats.org/officeDocument/2006/relationships" xmlns:p="http://schemas.openxmlformats.org/presentationml/2006/main">
+  <p:cSld>
+    <p:bg>
+      <p:bgPr>
+        <a:solidFill>
+          <a:schemeClr val="bg1"/>
+        </a:solidFill>
+        <a:effectLst/>
+      </p:bgPr>
+    </p:bg>
+    <p:spTree>
+      <p:nvGrpSpPr>
+        <p:cNvPr id="1" name=""/>
+        <p:cNvGrpSpPr/>
+        <p:nvPr/>
+      </p:nvGrpSpPr>
+      <p:grpSpPr>
+        <a:xfrm>
+          <a:off x="0" y="0"/>
+          <a:ext cx="0" cy="0"/>
+          <a:chOff x="0" y="0"/>
+          <a:chExt cx="0" cy="0"/>
+        </a:xfrm>
+      </p:grpSpPr>
+      <p:sp useBgFill="1">
+        <p:nvSpPr>
+          <p:cNvPr id="29" name="Rectangle 28">
+            <a:extLst>
+              <a:ext uri="{FF2B5EF4-FFF2-40B4-BE49-F238E27FC236}">
+                <a16:creationId xmlns:a16="http://schemas.microsoft.com/office/drawing/2014/main" xmlns="" id="{46F1F2C8-798B-4CCE-A851-94AFAF350BED}"/>
+              </a:ext>
+              <a:ext uri="{C183D7F6-B498-43B3-948B-1728B52AA6E4}">
+                <adec:decorative xmlns:adec="http://schemas.microsoft.com/office/drawing/2017/decorative" xmlns="" val="1"/>
+              </a:ext>
+            </a:extLst>
+          </p:cNvPr>
+          <p:cNvSpPr>
+            <a:spLocks noGrp="1" noRot="1" noChangeAspect="1" noMove="1" noResize="1" noEditPoints="1" noAdjustHandles="1" noChangeArrowheads="1" noChangeShapeType="1" noTextEdit="1"/>
+          </p:cNvSpPr>
+          <p:nvPr>
+            <p:extLst>
+              <p:ext uri="{386F3935-93C4-4BCD-93E2-E3B085C9AB24}">
+                <p16:designElem xmlns:p16="http://schemas.microsoft.com/office/powerpoint/2015/main" xmlns="" val="1"/>
+              </p:ext>
+            </p:extLst>
+          </p:nvPr>
+        </p:nvSpPr>
+        <p:spPr>
+          <a:xfrm>
+            <a:off x="3048" y="0"/>
+            <a:ext cx="12188952" cy="6858000"/>
+          </a:xfrm>
+          <a:prstGeom prst="rect">
+            <a:avLst/>
+          </a:prstGeom>
+          <a:ln>
+            <a:noFill/>
+          </a:ln>
+        </p:spPr>
+        <p:style>
+          <a:lnRef idx="2">
+            <a:schemeClr val="accent1">
+              <a:shade val="50000"/>
+            </a:schemeClr>
+          </a:lnRef>
+          <a:fillRef idx="1">
+            <a:schemeClr val="accent1"/>
+          </a:fillRef>
+          <a:effectRef idx="0">
+            <a:schemeClr val="accent1"/>
+          </a:effectRef>
+          <a:fontRef idx="minor">
+            <a:schemeClr val="lt1"/>
+          </a:fontRef>
+        </p:style>
+        <p:txBody>
+          <a:bodyPr rtlCol="0" anchor="ctr"/>
+          <a:lstStyle/>
+          <a:p>
+            <a:pPr algn="ctr"/>
+            <a:endParaRPr lang="en-US"/>
+          </a:p>
+        </p:txBody>
+      </p:sp>
+      <p:sp>
+        <p:nvSpPr>
+          <p:cNvPr id="2" name="Título 1"/>
+          <p:cNvSpPr>
+            <a:spLocks noGrp="1"/>
+          </p:cNvSpPr>
+          <p:nvPr>
+            <p:ph type="ctrTitle"/>
+          </p:nvPr>
+        </p:nvSpPr>
+        <p:spPr>
+          <a:xfrm>
+            <a:off x="1387851" y="2673032"/>
+            <a:ext cx="2909744" cy="1826884"/>
+          </a:xfrm>
+        </p:spPr>
+        <p:txBody>
+          <a:bodyPr>
+            <a:normAutofit/>
+          </a:bodyPr>
+          <a:lstStyle/>
+          <a:p>
+            <a:pPr algn="l"/>
+            <a:r>
+              <a:rPr lang="es-ES">
+                <a:ea typeface="Verdana"/>
+                <a:cs typeface="Calibri Light"/>
+              </a:rPr>
+              <a:t>O que é Identity?</a:t>
+            </a:r>
+          </a:p>
+        </p:txBody>
+      </p:sp>
+      <p:sp>
+        <p:nvSpPr>
+          <p:cNvPr id="31" name="Freeform: Shape 30">
+            <a:extLst>
+              <a:ext uri="{FF2B5EF4-FFF2-40B4-BE49-F238E27FC236}">
+                <a16:creationId xmlns:a16="http://schemas.microsoft.com/office/drawing/2014/main" xmlns="" id="{755E9CD0-04B0-4A3C-B291-AD913379C713}"/>
+              </a:ext>
+              <a:ext uri="{C183D7F6-B498-43B3-948B-1728B52AA6E4}">
+                <adec:decorative xmlns:adec="http://schemas.microsoft.com/office/drawing/2017/decorative" xmlns="" val="1"/>
+              </a:ext>
+            </a:extLst>
+          </p:cNvPr>
+          <p:cNvSpPr>
+            <a:spLocks noGrp="1" noRot="1" noChangeAspect="1" noMove="1" noResize="1" noEditPoints="1" noAdjustHandles="1" noChangeArrowheads="1" noChangeShapeType="1" noTextEdit="1"/>
+          </p:cNvSpPr>
+          <p:nvPr>
+            <p:extLst>
+              <p:ext uri="{386F3935-93C4-4BCD-93E2-E3B085C9AB24}">
+                <p16:designElem xmlns:p16="http://schemas.microsoft.com/office/powerpoint/2015/main" xmlns="" val="1"/>
+              </p:ext>
+            </p:extLst>
+          </p:nvPr>
+        </p:nvSpPr>
+        <p:spPr>
+          <a:xfrm>
+            <a:off x="10208695" y="1"/>
+            <a:ext cx="1135066" cy="477997"/>
+          </a:xfrm>
+          <a:custGeom>
+            <a:avLst/>
+            <a:gdLst>
+              <a:gd name="connsiteX0" fmla="*/ 0 w 1135066"/>
+              <a:gd name="connsiteY0" fmla="*/ 0 h 477997"/>
+              <a:gd name="connsiteX1" fmla="*/ 1135066 w 1135066"/>
+              <a:gd name="connsiteY1" fmla="*/ 0 h 477997"/>
+              <a:gd name="connsiteX2" fmla="*/ 1133370 w 1135066"/>
+              <a:gd name="connsiteY2" fmla="*/ 16827 h 477997"/>
+              <a:gd name="connsiteX3" fmla="*/ 567533 w 1135066"/>
+              <a:gd name="connsiteY3" fmla="*/ 477997 h 477997"/>
+              <a:gd name="connsiteX4" fmla="*/ 1696 w 1135066"/>
+              <a:gd name="connsiteY4" fmla="*/ 16827 h 477997"/>
+            </a:gdLst>
+            <a:ahLst/>
+            <a:cxnLst>
+              <a:cxn ang="0">
+                <a:pos x="connsiteX0" y="connsiteY0"/>
+              </a:cxn>
+              <a:cxn ang="0">
+                <a:pos x="connsiteX1" y="connsiteY1"/>
+              </a:cxn>
+              <a:cxn ang="0">
+                <a:pos x="connsiteX2" y="connsiteY2"/>
+              </a:cxn>
+              <a:cxn ang="0">
+                <a:pos x="connsiteX3" y="connsiteY3"/>
+              </a:cxn>
+              <a:cxn ang="0">
+                <a:pos x="connsiteX4" y="connsiteY4"/>
+              </a:cxn>
+            </a:cxnLst>
+            <a:rect l="l" t="t" r="r" b="b"/>
+            <a:pathLst>
+              <a:path w="1135066" h="477997">
+                <a:moveTo>
+                  <a:pt x="0" y="0"/>
+                </a:moveTo>
+                <a:lnTo>
+                  <a:pt x="1135066" y="0"/>
+                </a:lnTo>
+                <a:lnTo>
+                  <a:pt x="1133370" y="16827"/>
+                </a:lnTo>
+                <a:cubicBezTo>
+                  <a:pt x="1079514" y="280016"/>
+                  <a:pt x="846644" y="477997"/>
+                  <a:pt x="567533" y="477997"/>
+                </a:cubicBezTo>
+                <a:cubicBezTo>
+                  <a:pt x="288422" y="477997"/>
+                  <a:pt x="55552" y="280016"/>
+                  <a:pt x="1696" y="16827"/>
+                </a:cubicBezTo>
+                <a:close/>
+              </a:path>
+            </a:pathLst>
+          </a:custGeom>
+          <a:solidFill>
+            <a:schemeClr val="accent5"/>
+          </a:solidFill>
+          <a:ln>
+            <a:noFill/>
+          </a:ln>
+        </p:spPr>
+        <p:style>
+          <a:lnRef idx="2">
+            <a:schemeClr val="accent1">
+              <a:shade val="50000"/>
+            </a:schemeClr>
+          </a:lnRef>
+          <a:fillRef idx="1">
+            <a:schemeClr val="accent1"/>
+          </a:fillRef>
+          <a:effectRef idx="0">
+            <a:schemeClr val="accent1"/>
+          </a:effectRef>
+          <a:fontRef idx="minor">
+            <a:schemeClr val="lt1"/>
+          </a:fontRef>
+        </p:style>
+        <p:txBody>
+          <a:bodyPr wrap="square" rtlCol="0" anchor="ctr">
+            <a:noAutofit/>
+          </a:bodyPr>
+          <a:lstStyle/>
+          <a:p>
+            <a:pPr algn="ctr"/>
+            <a:endParaRPr lang="en-US"/>
+          </a:p>
+        </p:txBody>
+      </p:sp>
+      <p:sp>
+        <p:nvSpPr>
+          <p:cNvPr id="33" name="Oval 32">
+            <a:extLst>
+              <a:ext uri="{FF2B5EF4-FFF2-40B4-BE49-F238E27FC236}">
+                <a16:creationId xmlns:a16="http://schemas.microsoft.com/office/drawing/2014/main" xmlns="" id="{1DD8BF3B-6066-418C-8D1A-75C5E396FC04}"/>
+              </a:ext>
+              <a:ext uri="{C183D7F6-B498-43B3-948B-1728B52AA6E4}">
+                <adec:decorative xmlns:adec="http://schemas.microsoft.com/office/drawing/2017/decorative" xmlns="" val="1"/>
+              </a:ext>
+            </a:extLst>
+          </p:cNvPr>
+          <p:cNvSpPr>
+            <a:spLocks noGrp="1" noRot="1" noChangeAspect="1" noMove="1" noResize="1" noEditPoints="1" noAdjustHandles="1" noChangeArrowheads="1" noChangeShapeType="1" noTextEdit="1"/>
+          </p:cNvSpPr>
+          <p:nvPr>
+            <p:extLst>
+              <p:ext uri="{386F3935-93C4-4BCD-93E2-E3B085C9AB24}">
+                <p16:designElem xmlns:p16="http://schemas.microsoft.com/office/powerpoint/2015/main" xmlns="" val="1"/>
+              </p:ext>
+            </p:extLst>
+          </p:nvPr>
+        </p:nvSpPr>
+        <p:spPr>
+          <a:xfrm>
+            <a:off x="6821310" y="2624479"/>
+            <a:ext cx="812427" cy="812427"/>
+          </a:xfrm>
+          <a:prstGeom prst="ellipse">
+            <a:avLst/>
+          </a:prstGeom>
+          <a:noFill/>
+          <a:ln w="127000">
+            <a:solidFill>
+              <a:schemeClr val="accent5"/>
+            </a:solidFill>
+          </a:ln>
+        </p:spPr>
+        <p:style>
+          <a:lnRef idx="2">
+            <a:schemeClr val="accent1">
+              <a:shade val="50000"/>
+            </a:schemeClr>
+          </a:lnRef>
+          <a:fillRef idx="1">
+            <a:schemeClr val="accent1"/>
+          </a:fillRef>
+          <a:effectRef idx="0">
+            <a:schemeClr val="accent1"/>
+          </a:effectRef>
+          <a:fontRef idx="minor">
+            <a:schemeClr val="lt1"/>
+          </a:fontRef>
+        </p:style>
+        <p:txBody>
+          <a:bodyPr rtlCol="0" anchor="ctr"/>
+          <a:lstStyle/>
+          <a:p>
+            <a:pPr algn="ctr"/>
+            <a:endParaRPr lang="en-US" dirty="0"/>
+          </a:p>
+        </p:txBody>
+      </p:sp>
+      <p:sp>
+        <p:nvSpPr>
+          <p:cNvPr id="35" name="Block Arc 34">
+            <a:extLst>
+              <a:ext uri="{FF2B5EF4-FFF2-40B4-BE49-F238E27FC236}">
+                <a16:creationId xmlns:a16="http://schemas.microsoft.com/office/drawing/2014/main" xmlns="" id="{80BC66F9-7A74-4286-AD22-1174052CC22C}"/>
+              </a:ext>
+              <a:ext uri="{C183D7F6-B498-43B3-948B-1728B52AA6E4}">
+                <adec:decorative xmlns:adec="http://schemas.microsoft.com/office/drawing/2017/decorative" xmlns="" val="1"/>
+              </a:ext>
+            </a:extLst>
+          </p:cNvPr>
+          <p:cNvSpPr>
+            <a:spLocks noGrp="1" noRot="1" noChangeAspect="1" noMove="1" noResize="1" noEditPoints="1" noAdjustHandles="1" noChangeArrowheads="1" noChangeShapeType="1" noTextEdit="1"/>
+          </p:cNvSpPr>
+          <p:nvPr>
+            <p:extLst>
+              <p:ext uri="{386F3935-93C4-4BCD-93E2-E3B085C9AB24}">
+                <p16:designElem xmlns:p16="http://schemas.microsoft.com/office/powerpoint/2015/main" xmlns="" val="1"/>
+              </p:ext>
+            </p:extLst>
+          </p:nvPr>
+        </p:nvSpPr>
+        <p:spPr>
+          <a:xfrm rot="16200000">
+            <a:off x="8912417" y="1202394"/>
+            <a:ext cx="2387600" cy="2387600"/>
+          </a:xfrm>
+          <a:prstGeom prst="blockArc">
+            <a:avLst/>
+          </a:prstGeom>
+          <a:solidFill>
+            <a:schemeClr val="accent2"/>
+          </a:solidFill>
+          <a:ln>
+            <a:noFill/>
+          </a:ln>
+        </p:spPr>
+        <p:style>
+          <a:lnRef idx="2">
+            <a:schemeClr val="accent1">
+              <a:shade val="50000"/>
+            </a:schemeClr>
+          </a:lnRef>
+          <a:fillRef idx="1">
+            <a:schemeClr val="accent1"/>
+          </a:fillRef>
+          <a:effectRef idx="0">
+            <a:schemeClr val="accent1"/>
+          </a:effectRef>
+          <a:fontRef idx="minor">
+            <a:schemeClr val="lt1"/>
+          </a:fontRef>
+        </p:style>
+        <p:txBody>
+          <a:bodyPr rtlCol="0" anchor="ctr"/>
+          <a:lstStyle/>
+          <a:p>
+            <a:pPr algn="ctr"/>
+            <a:endParaRPr lang="en-US">
+              <a:solidFill>
+                <a:schemeClr val="tx1"/>
+              </a:solidFill>
+            </a:endParaRPr>
+          </a:p>
+        </p:txBody>
+      </p:sp>
+      <p:sp>
+        <p:nvSpPr>
+          <p:cNvPr id="37" name="Freeform: Shape 36">
+            <a:extLst>
+              <a:ext uri="{FF2B5EF4-FFF2-40B4-BE49-F238E27FC236}">
+                <a16:creationId xmlns:a16="http://schemas.microsoft.com/office/drawing/2014/main" xmlns="" id="{D8142CC3-2B5C-48E6-9DF0-6C8ACBAF23EF}"/>
+              </a:ext>
+              <a:ext uri="{C183D7F6-B498-43B3-948B-1728B52AA6E4}">
+                <adec:decorative xmlns:adec="http://schemas.microsoft.com/office/drawing/2017/decorative" xmlns="" val="1"/>
+              </a:ext>
+            </a:extLst>
+          </p:cNvPr>
+          <p:cNvSpPr>
+            <a:spLocks noGrp="1" noRot="1" noChangeAspect="1" noMove="1" noResize="1" noEditPoints="1" noAdjustHandles="1" noChangeArrowheads="1" noChangeShapeType="1" noTextEdit="1"/>
+          </p:cNvSpPr>
+          <p:nvPr>
+            <p:extLst>
+              <p:ext uri="{386F3935-93C4-4BCD-93E2-E3B085C9AB24}">
+                <p16:designElem xmlns:p16="http://schemas.microsoft.com/office/powerpoint/2015/main" xmlns="" val="1"/>
+              </p:ext>
+            </p:extLst>
+          </p:nvPr>
+        </p:nvSpPr>
+        <p:spPr>
+          <a:xfrm>
+            <a:off x="6821310" y="0"/>
+            <a:ext cx="2315251" cy="1550992"/>
+          </a:xfrm>
+          <a:custGeom>
+            <a:avLst/>
+            <a:gdLst>
+              <a:gd name="connsiteX0" fmla="*/ 0 w 2315251"/>
+              <a:gd name="connsiteY0" fmla="*/ 0 h 1550992"/>
+              <a:gd name="connsiteX1" fmla="*/ 138700 w 2315251"/>
+              <a:gd name="connsiteY1" fmla="*/ 0 h 1550992"/>
+              <a:gd name="connsiteX2" fmla="*/ 138700 w 2315251"/>
+              <a:gd name="connsiteY2" fmla="*/ 1361400 h 1550992"/>
+              <a:gd name="connsiteX3" fmla="*/ 2107387 w 2315251"/>
+              <a:gd name="connsiteY3" fmla="*/ 222673 h 1550992"/>
+              <a:gd name="connsiteX4" fmla="*/ 1722420 w 2315251"/>
+              <a:gd name="connsiteY4" fmla="*/ 0 h 1550992"/>
+              <a:gd name="connsiteX5" fmla="*/ 1999436 w 2315251"/>
+              <a:gd name="connsiteY5" fmla="*/ 0 h 1550992"/>
+              <a:gd name="connsiteX6" fmla="*/ 2280549 w 2315251"/>
+              <a:gd name="connsiteY6" fmla="*/ 162605 h 1550992"/>
+              <a:gd name="connsiteX7" fmla="*/ 2305953 w 2315251"/>
+              <a:gd name="connsiteY7" fmla="*/ 257336 h 1550992"/>
+              <a:gd name="connsiteX8" fmla="*/ 2280549 w 2315251"/>
+              <a:gd name="connsiteY8" fmla="*/ 282740 h 1550992"/>
+              <a:gd name="connsiteX9" fmla="*/ 104026 w 2315251"/>
+              <a:gd name="connsiteY9" fmla="*/ 1541710 h 1550992"/>
+              <a:gd name="connsiteX10" fmla="*/ 69351 w 2315251"/>
+              <a:gd name="connsiteY10" fmla="*/ 1550992 h 1550992"/>
+              <a:gd name="connsiteX11" fmla="*/ 0 w 2315251"/>
+              <a:gd name="connsiteY11" fmla="*/ 1481643 h 1550992"/>
+            </a:gdLst>
+            <a:ahLst/>
+            <a:cxnLst>
+              <a:cxn ang="0">
+                <a:pos x="connsiteX0" y="connsiteY0"/>
+              </a:cxn>
+              <a:cxn ang="0">
+                <a:pos x="connsiteX1" y="connsiteY1"/>
+              </a:cxn>
+              <a:cxn ang="0">
+                <a:pos x="connsiteX2" y="connsiteY2"/>
+              </a:cxn>
+              <a:cxn ang="0">
+                <a:pos x="connsiteX3" y="connsiteY3"/>
+              </a:cxn>
+              <a:cxn ang="0">
+                <a:pos x="connsiteX4" y="connsiteY4"/>
+              </a:cxn>
+              <a:cxn ang="0">
+                <a:pos x="connsiteX5" y="connsiteY5"/>
+              </a:cxn>
+              <a:cxn ang="0">
+                <a:pos x="connsiteX6" y="connsiteY6"/>
+              </a:cxn>
+              <a:cxn ang="0">
+                <a:pos x="connsiteX7" y="connsiteY7"/>
+              </a:cxn>
+              <a:cxn ang="0">
+                <a:pos x="connsiteX8" y="connsiteY8"/>
+              </a:cxn>
+              <a:cxn ang="0">
+                <a:pos x="connsiteX9" y="connsiteY9"/>
+              </a:cxn>
+              <a:cxn ang="0">
+                <a:pos x="connsiteX10" y="connsiteY10"/>
+              </a:cxn>
+              <a:cxn ang="0">
+                <a:pos x="connsiteX11" y="connsiteY11"/>
+              </a:cxn>
+            </a:cxnLst>
+            <a:rect l="l" t="t" r="r" b="b"/>
+            <a:pathLst>
+              <a:path w="2315251" h="1550992">
+                <a:moveTo>
+                  <a:pt x="0" y="0"/>
+                </a:moveTo>
+                <a:lnTo>
+                  <a:pt x="138700" y="0"/>
+                </a:lnTo>
+                <a:lnTo>
+                  <a:pt x="138700" y="1361400"/>
+                </a:lnTo>
+                <a:lnTo>
+                  <a:pt x="2107387" y="222673"/>
+                </a:lnTo>
+                <a:lnTo>
+                  <a:pt x="1722420" y="0"/>
+                </a:lnTo>
+                <a:lnTo>
+                  <a:pt x="1999436" y="0"/>
+                </a:lnTo>
+                <a:lnTo>
+                  <a:pt x="2280549" y="162605"/>
+                </a:lnTo>
+                <a:cubicBezTo>
+                  <a:pt x="2313720" y="181745"/>
+                  <a:pt x="2325104" y="224155"/>
+                  <a:pt x="2305953" y="257336"/>
+                </a:cubicBezTo>
+                <a:cubicBezTo>
+                  <a:pt x="2299872" y="267889"/>
+                  <a:pt x="2291101" y="276648"/>
+                  <a:pt x="2280549" y="282740"/>
+                </a:cubicBezTo>
+                <a:lnTo>
+                  <a:pt x="104026" y="1541710"/>
+                </a:lnTo>
+                <a:cubicBezTo>
+                  <a:pt x="93484" y="1547802"/>
+                  <a:pt x="81523" y="1551003"/>
+                  <a:pt x="69351" y="1550992"/>
+                </a:cubicBezTo>
+                <a:cubicBezTo>
+                  <a:pt x="31049" y="1550992"/>
+                  <a:pt x="0" y="1519944"/>
+                  <a:pt x="0" y="1481643"/>
+                </a:cubicBezTo>
+                <a:close/>
+              </a:path>
+            </a:pathLst>
+          </a:custGeom>
+          <a:solidFill>
+            <a:schemeClr val="accent6"/>
+          </a:solidFill>
+          <a:ln w="9525" cap="flat">
+            <a:noFill/>
+            <a:prstDash val="solid"/>
+            <a:miter/>
+          </a:ln>
+        </p:spPr>
+        <p:txBody>
+          <a:bodyPr rtlCol="0" anchor="ctr"/>
+          <a:lstStyle/>
+          <a:p>
+            <a:endParaRPr lang="en-US" dirty="0"/>
+          </a:p>
+        </p:txBody>
+      </p:sp>
+      <p:cxnSp>
+        <p:nvCxnSpPr>
+          <p:cNvPr id="39" name="Straight Connector 38">
+            <a:extLst>
+              <a:ext uri="{FF2B5EF4-FFF2-40B4-BE49-F238E27FC236}">
+                <a16:creationId xmlns:a16="http://schemas.microsoft.com/office/drawing/2014/main" xmlns="" id="{7B2D303B-3DD0-4319-9EAD-361847FEC71D}"/>
+              </a:ext>
+              <a:ext uri="{C183D7F6-B498-43B3-948B-1728B52AA6E4}">
+                <adec:decorative xmlns:adec="http://schemas.microsoft.com/office/drawing/2017/decorative" xmlns="" val="1"/>
+              </a:ext>
+            </a:extLst>
+          </p:cNvPr>
+          <p:cNvCxnSpPr>
+            <a:cxnSpLocks noGrp="1" noRot="1" noChangeAspect="1" noMove="1" noResize="1" noEditPoints="1" noAdjustHandles="1" noChangeArrowheads="1" noChangeShapeType="1"/>
+          </p:cNvCxnSpPr>
+          <p:nvPr>
+            <p:extLst>
+              <p:ext uri="{386F3935-93C4-4BCD-93E2-E3B085C9AB24}">
+                <p16:designElem xmlns:p16="http://schemas.microsoft.com/office/powerpoint/2015/main" xmlns="" val="1"/>
+              </p:ext>
+            </p:extLst>
+          </p:nvPr>
+        </p:nvCxnSpPr>
+        <p:spPr>
+          <a:xfrm>
+            <a:off x="11724638" y="1331572"/>
+            <a:ext cx="0" cy="1597708"/>
+          </a:xfrm>
+          <a:prstGeom prst="line">
+            <a:avLst/>
+          </a:prstGeom>
+          <a:ln w="127000" cap="rnd">
+            <a:solidFill>
+              <a:schemeClr val="accent4"/>
+            </a:solidFill>
+            <a:prstDash val="dash"/>
+          </a:ln>
+        </p:spPr>
+        <p:style>
+          <a:lnRef idx="1">
+            <a:schemeClr val="accent1"/>
+          </a:lnRef>
+          <a:fillRef idx="0">
+            <a:schemeClr val="accent1"/>
+          </a:fillRef>
+          <a:effectRef idx="0">
+            <a:schemeClr val="accent1"/>
+          </a:effectRef>
+          <a:fontRef idx="minor">
+            <a:schemeClr val="tx1"/>
+          </a:fontRef>
+        </p:style>
+      </p:cxnSp>
+      <p:sp>
+        <p:nvSpPr>
+          <p:cNvPr id="41" name="Freeform: Shape 40">
+            <a:extLst>
+              <a:ext uri="{FF2B5EF4-FFF2-40B4-BE49-F238E27FC236}">
+                <a16:creationId xmlns:a16="http://schemas.microsoft.com/office/drawing/2014/main" xmlns="" id="{46A89C79-8EF3-4AF9-B3D9-59A883F41C83}"/>
+              </a:ext>
+              <a:ext uri="{C183D7F6-B498-43B3-948B-1728B52AA6E4}">
+                <adec:decorative xmlns:adec="http://schemas.microsoft.com/office/drawing/2017/decorative" xmlns="" val="1"/>
+              </a:ext>
+            </a:extLst>
+          </p:cNvPr>
+          <p:cNvSpPr>
+            <a:spLocks noGrp="1" noRot="1" noChangeAspect="1" noMove="1" noResize="1" noEditPoints="1" noAdjustHandles="1" noChangeArrowheads="1" noChangeShapeType="1" noTextEdit="1"/>
+          </p:cNvSpPr>
+          <p:nvPr>
+            <p:extLst>
+              <p:ext uri="{386F3935-93C4-4BCD-93E2-E3B085C9AB24}">
+                <p16:designElem xmlns:p16="http://schemas.microsoft.com/office/powerpoint/2015/main" xmlns="" val="1"/>
+              </p:ext>
+            </p:extLst>
+          </p:nvPr>
+        </p:nvSpPr>
+        <p:spPr>
+          <a:xfrm>
+            <a:off x="11005550" y="4112081"/>
+            <a:ext cx="1186451" cy="1771650"/>
+          </a:xfrm>
+          <a:custGeom>
+            <a:avLst/>
+            <a:gdLst>
+              <a:gd name="connsiteX0" fmla="*/ 61913 w 1186451"/>
+              <a:gd name="connsiteY0" fmla="*/ 0 h 1771650"/>
+              <a:gd name="connsiteX1" fmla="*/ 1186451 w 1186451"/>
+              <a:gd name="connsiteY1" fmla="*/ 0 h 1771650"/>
+              <a:gd name="connsiteX2" fmla="*/ 1186451 w 1186451"/>
+              <a:gd name="connsiteY2" fmla="*/ 123825 h 1771650"/>
+              <a:gd name="connsiteX3" fmla="*/ 123825 w 1186451"/>
+              <a:gd name="connsiteY3" fmla="*/ 123825 h 1771650"/>
+              <a:gd name="connsiteX4" fmla="*/ 123825 w 1186451"/>
+              <a:gd name="connsiteY4" fmla="*/ 1647825 h 1771650"/>
+              <a:gd name="connsiteX5" fmla="*/ 1186451 w 1186451"/>
+              <a:gd name="connsiteY5" fmla="*/ 1647825 h 1771650"/>
+              <a:gd name="connsiteX6" fmla="*/ 1186451 w 1186451"/>
+              <a:gd name="connsiteY6" fmla="*/ 1771650 h 1771650"/>
+              <a:gd name="connsiteX7" fmla="*/ 61913 w 1186451"/>
+              <a:gd name="connsiteY7" fmla="*/ 1771650 h 1771650"/>
+              <a:gd name="connsiteX8" fmla="*/ 0 w 1186451"/>
+              <a:gd name="connsiteY8" fmla="*/ 1709738 h 1771650"/>
+              <a:gd name="connsiteX9" fmla="*/ 0 w 1186451"/>
+              <a:gd name="connsiteY9" fmla="*/ 61913 h 1771650"/>
+              <a:gd name="connsiteX10" fmla="*/ 61913 w 1186451"/>
+              <a:gd name="connsiteY10" fmla="*/ 0 h 1771650"/>
+            </a:gdLst>
+            <a:ahLst/>
+            <a:cxnLst>
+              <a:cxn ang="0">
+                <a:pos x="connsiteX0" y="connsiteY0"/>
+              </a:cxn>
+              <a:cxn ang="0">
+                <a:pos x="connsiteX1" y="connsiteY1"/>
+              </a:cxn>
+              <a:cxn ang="0">
+                <a:pos x="connsiteX2" y="connsiteY2"/>
+              </a:cxn>
+              <a:cxn ang="0">
+                <a:pos x="connsiteX3" y="connsiteY3"/>
+              </a:cxn>
+              <a:cxn ang="0">
+                <a:pos x="connsiteX4" y="connsiteY4"/>
+              </a:cxn>
+              <a:cxn ang="0">
+                <a:pos x="connsiteX5" y="connsiteY5"/>
+              </a:cxn>
+              <a:cxn ang="0">
+                <a:pos x="connsiteX6" y="connsiteY6"/>
+              </a:cxn>
+              <a:cxn ang="0">
+                <a:pos x="connsiteX7" y="connsiteY7"/>
+              </a:cxn>
+              <a:cxn ang="0">
+                <a:pos x="connsiteX8" y="connsiteY8"/>
+              </a:cxn>
+              <a:cxn ang="0">
+                <a:pos x="connsiteX9" y="connsiteY9"/>
+              </a:cxn>
+              <a:cxn ang="0">
+                <a:pos x="connsiteX10" y="connsiteY10"/>
+              </a:cxn>
+            </a:cxnLst>
+            <a:rect l="l" t="t" r="r" b="b"/>
+            <a:pathLst>
+              <a:path w="1186451" h="1771650">
+                <a:moveTo>
+                  <a:pt x="61913" y="0"/>
+                </a:moveTo>
+                <a:lnTo>
+                  <a:pt x="1186451" y="0"/>
+                </a:lnTo>
+                <a:lnTo>
+                  <a:pt x="1186451" y="123825"/>
+                </a:lnTo>
+                <a:lnTo>
+                  <a:pt x="123825" y="123825"/>
+                </a:lnTo>
+                <a:lnTo>
+                  <a:pt x="123825" y="1647825"/>
+                </a:lnTo>
+                <a:lnTo>
+                  <a:pt x="1186451" y="1647825"/>
+                </a:lnTo>
+                <a:lnTo>
+                  <a:pt x="1186451" y="1771650"/>
+                </a:lnTo>
+                <a:lnTo>
+                  <a:pt x="61913" y="1771650"/>
+                </a:lnTo>
+                <a:cubicBezTo>
+                  <a:pt x="27719" y="1771650"/>
+                  <a:pt x="0" y="1743932"/>
+                  <a:pt x="0" y="1709738"/>
+                </a:cubicBezTo>
+                <a:lnTo>
+                  <a:pt x="0" y="61913"/>
+                </a:lnTo>
+                <a:cubicBezTo>
+                  <a:pt x="0" y="27719"/>
+                  <a:pt x="27719" y="0"/>
+                  <a:pt x="61913" y="0"/>
+                </a:cubicBezTo>
+                <a:close/>
+              </a:path>
+            </a:pathLst>
+          </a:custGeom>
+          <a:solidFill>
+            <a:schemeClr val="accent6"/>
+          </a:solidFill>
+          <a:ln w="9525" cap="flat">
+            <a:noFill/>
+            <a:prstDash val="solid"/>
+            <a:miter/>
+          </a:ln>
+        </p:spPr>
+        <p:txBody>
+          <a:bodyPr rtlCol="0" anchor="ctr"/>
+          <a:lstStyle/>
+          <a:p>
+            <a:endParaRPr lang="en-US"/>
+          </a:p>
+        </p:txBody>
+      </p:sp>
+      <p:sp>
+        <p:nvSpPr>
+          <p:cNvPr id="43" name="Arc 42">
+            <a:extLst>
+              <a:ext uri="{FF2B5EF4-FFF2-40B4-BE49-F238E27FC236}">
+                <a16:creationId xmlns:a16="http://schemas.microsoft.com/office/drawing/2014/main" xmlns="" id="{EFE5CE34-4543-42E5-B82C-1F3D12422CDD}"/>
+              </a:ext>
+              <a:ext uri="{C183D7F6-B498-43B3-948B-1728B52AA6E4}">
+                <adec:decorative xmlns:adec="http://schemas.microsoft.com/office/drawing/2017/decorative" xmlns="" val="1"/>
+              </a:ext>
+            </a:extLst>
+          </p:cNvPr>
+          <p:cNvSpPr>
+            <a:spLocks noGrp="1" noRot="1" noChangeAspect="1" noMove="1" noResize="1" noEditPoints="1" noAdjustHandles="1" noChangeArrowheads="1" noChangeShapeType="1" noTextEdit="1"/>
+          </p:cNvSpPr>
+          <p:nvPr>
+            <p:extLst>
+              <p:ext uri="{386F3935-93C4-4BCD-93E2-E3B085C9AB24}">
+                <p16:designElem xmlns:p16="http://schemas.microsoft.com/office/powerpoint/2015/main" xmlns="" val="1"/>
+              </p:ext>
+            </p:extLst>
+          </p:nvPr>
+        </p:nvSpPr>
+        <p:spPr>
+          <a:xfrm rot="20992895">
+            <a:off x="6086940" y="4145122"/>
+            <a:ext cx="4083433" cy="4083433"/>
+          </a:xfrm>
+          <a:prstGeom prst="arc">
+            <a:avLst/>
+          </a:prstGeom>
+          <a:ln w="127000" cap="rnd">
+            <a:solidFill>
+              <a:schemeClr val="accent4"/>
+            </a:solidFill>
+            <a:prstDash val="dash"/>
+          </a:ln>
+        </p:spPr>
+        <p:style>
+          <a:lnRef idx="1">
+            <a:schemeClr val="accent1"/>
+          </a:lnRef>
+          <a:fillRef idx="0">
+            <a:schemeClr val="accent1"/>
+          </a:fillRef>
+          <a:effectRef idx="0">
+            <a:schemeClr val="accent1"/>
+          </a:effectRef>
+          <a:fontRef idx="minor">
+            <a:schemeClr val="tx1"/>
+          </a:fontRef>
+        </p:style>
+        <p:txBody>
+          <a:bodyPr rtlCol="0" anchor="ctr"/>
+          <a:lstStyle/>
+          <a:p>
+            <a:pPr algn="ctr"/>
+            <a:endParaRPr lang="en-US" dirty="0"/>
+          </a:p>
+        </p:txBody>
+      </p:sp>
+      <p:sp>
+        <p:nvSpPr>
+          <p:cNvPr id="45" name="Freeform: Shape 44">
+            <a:extLst>
+              <a:ext uri="{FF2B5EF4-FFF2-40B4-BE49-F238E27FC236}">
+                <a16:creationId xmlns:a16="http://schemas.microsoft.com/office/drawing/2014/main" xmlns="" id="{72AF41FE-63D7-4695-81D2-66D2510E4486}"/>
+              </a:ext>
+              <a:ext uri="{C183D7F6-B498-43B3-948B-1728B52AA6E4}">
+                <adec:decorative xmlns:adec="http://schemas.microsoft.com/office/drawing/2017/decorative" xmlns="" val="1"/>
+              </a:ext>
+            </a:extLst>
+          </p:cNvPr>
+          <p:cNvSpPr>
+            <a:spLocks noGrp="1" noRot="1" noChangeAspect="1" noMove="1" noResize="1" noEditPoints="1" noAdjustHandles="1" noChangeArrowheads="1" noChangeShapeType="1" noTextEdit="1"/>
+          </p:cNvSpPr>
+          <p:nvPr>
+            <p:extLst>
+              <p:ext uri="{386F3935-93C4-4BCD-93E2-E3B085C9AB24}">
+                <p16:designElem xmlns:p16="http://schemas.microsoft.com/office/powerpoint/2015/main" xmlns="" val="1"/>
+              </p:ext>
+            </p:extLst>
+          </p:nvPr>
+        </p:nvSpPr>
+        <p:spPr>
+          <a:xfrm>
+            <a:off x="6821310" y="4962670"/>
+            <a:ext cx="2643352" cy="1895331"/>
+          </a:xfrm>
+          <a:custGeom>
+            <a:avLst/>
+            <a:gdLst>
+              <a:gd name="connsiteX0" fmla="*/ 1321676 w 2643352"/>
+              <a:gd name="connsiteY0" fmla="*/ 0 h 1895331"/>
+              <a:gd name="connsiteX1" fmla="*/ 2643352 w 2643352"/>
+              <a:gd name="connsiteY1" fmla="*/ 1321676 h 1895331"/>
+              <a:gd name="connsiteX2" fmla="*/ 2539488 w 2643352"/>
+              <a:gd name="connsiteY2" fmla="*/ 1836132 h 1895331"/>
+              <a:gd name="connsiteX3" fmla="*/ 2510970 w 2643352"/>
+              <a:gd name="connsiteY3" fmla="*/ 1895331 h 1895331"/>
+              <a:gd name="connsiteX4" fmla="*/ 132382 w 2643352"/>
+              <a:gd name="connsiteY4" fmla="*/ 1895331 h 1895331"/>
+              <a:gd name="connsiteX5" fmla="*/ 103864 w 2643352"/>
+              <a:gd name="connsiteY5" fmla="*/ 1836132 h 1895331"/>
+              <a:gd name="connsiteX6" fmla="*/ 0 w 2643352"/>
+              <a:gd name="connsiteY6" fmla="*/ 1321676 h 1895331"/>
+              <a:gd name="connsiteX7" fmla="*/ 1321676 w 2643352"/>
+              <a:gd name="connsiteY7" fmla="*/ 0 h 1895331"/>
+            </a:gdLst>
+            <a:ahLst/>
+            <a:cxnLst>
+              <a:cxn ang="0">
+                <a:pos x="connsiteX0" y="connsiteY0"/>
+              </a:cxn>
+              <a:cxn ang="0">
+                <a:pos x="connsiteX1" y="connsiteY1"/>
+              </a:cxn>
+              <a:cxn ang="0">
+                <a:pos x="connsiteX2" y="connsiteY2"/>
+              </a:cxn>
+              <a:cxn ang="0">
+                <a:pos x="connsiteX3" y="connsiteY3"/>
+              </a:cxn>
+              <a:cxn ang="0">
+                <a:pos x="connsiteX4" y="connsiteY4"/>
+              </a:cxn>
+              <a:cxn ang="0">
+                <a:pos x="connsiteX5" y="connsiteY5"/>
+              </a:cxn>
+              <a:cxn ang="0">
+                <a:pos x="connsiteX6" y="connsiteY6"/>
+              </a:cxn>
+              <a:cxn ang="0">
+                <a:pos x="connsiteX7" y="connsiteY7"/>
+              </a:cxn>
+            </a:cxnLst>
+            <a:rect l="l" t="t" r="r" b="b"/>
+            <a:pathLst>
+              <a:path w="2643352" h="1895331">
+                <a:moveTo>
+                  <a:pt x="1321676" y="0"/>
+                </a:moveTo>
+                <a:cubicBezTo>
+                  <a:pt x="2051617" y="0"/>
+                  <a:pt x="2643352" y="591735"/>
+                  <a:pt x="2643352" y="1321676"/>
+                </a:cubicBezTo>
+                <a:cubicBezTo>
+                  <a:pt x="2643352" y="1504161"/>
+                  <a:pt x="2606369" y="1678009"/>
+                  <a:pt x="2539488" y="1836132"/>
+                </a:cubicBezTo>
+                <a:lnTo>
+                  <a:pt x="2510970" y="1895331"/>
+                </a:lnTo>
+                <a:lnTo>
+                  <a:pt x="132382" y="1895331"/>
+                </a:lnTo>
+                <a:lnTo>
+                  <a:pt x="103864" y="1836132"/>
+                </a:lnTo>
+                <a:cubicBezTo>
+                  <a:pt x="36984" y="1678009"/>
+                  <a:pt x="0" y="1504161"/>
+                  <a:pt x="0" y="1321676"/>
+                </a:cubicBezTo>
+                <a:cubicBezTo>
+                  <a:pt x="0" y="591735"/>
+                  <a:pt x="591735" y="0"/>
+                  <a:pt x="1321676" y="0"/>
+                </a:cubicBezTo>
+                <a:close/>
+              </a:path>
+            </a:pathLst>
+          </a:custGeom>
+          <a:solidFill>
+            <a:schemeClr val="accent2"/>
+          </a:solidFill>
+          <a:ln>
+            <a:noFill/>
+          </a:ln>
+        </p:spPr>
+        <p:style>
+          <a:lnRef idx="2">
+            <a:schemeClr val="accent1">
+              <a:shade val="50000"/>
+            </a:schemeClr>
+          </a:lnRef>
+          <a:fillRef idx="1">
+            <a:schemeClr val="accent1"/>
+          </a:fillRef>
+          <a:effectRef idx="0">
+            <a:schemeClr val="accent1"/>
+          </a:effectRef>
+          <a:fontRef idx="minor">
+            <a:schemeClr val="lt1"/>
+          </a:fontRef>
+        </p:style>
+        <p:txBody>
+          <a:bodyPr rtlCol="0" anchor="ctr"/>
+          <a:lstStyle/>
+          <a:p>
+            <a:pPr algn="ctr"/>
+            <a:endParaRPr lang="en-US"/>
+          </a:p>
+        </p:txBody>
+      </p:sp>
+    </p:spTree>
+    <p:extLst>
+      <p:ext uri="{BB962C8B-B14F-4D97-AF65-F5344CB8AC3E}">
+        <p14:creationId xmlns:p14="http://schemas.microsoft.com/office/powerpoint/2010/main" val="1247258054"/>
+      </p:ext>
+    </p:extLst>
+  </p:cSld>
+  <p:clrMapOvr>
+    <a:masterClrMapping/>
+  </p:clrMapOvr>
+</p:sld>
+</file>
+
+<file path=ppt/slides/slide18.xml><?xml version="1.0" encoding="utf-8"?>
+<p:sld xmlns:a="http://schemas.openxmlformats.org/drawingml/2006/main" xmlns:r="http://schemas.openxmlformats.org/officeDocument/2006/relationships" xmlns:p="http://schemas.openxmlformats.org/presentationml/2006/main">
+  <p:cSld>
+    <p:bg>
+      <p:bgPr>
+        <a:solidFill>
+          <a:schemeClr val="bg1"/>
+        </a:solidFill>
+        <a:effectLst/>
+      </p:bgPr>
+    </p:bg>
+    <p:spTree>
+      <p:nvGrpSpPr>
+        <p:cNvPr id="1" name=""/>
+        <p:cNvGrpSpPr/>
+        <p:nvPr/>
+      </p:nvGrpSpPr>
+      <p:grpSpPr>
+        <a:xfrm>
+          <a:off x="0" y="0"/>
+          <a:ext cx="0" cy="0"/>
+          <a:chOff x="0" y="0"/>
+          <a:chExt cx="0" cy="0"/>
+        </a:xfrm>
+      </p:grpSpPr>
+      <p:sp useBgFill="1">
+        <p:nvSpPr>
+          <p:cNvPr id="18" name="Rectangle 20">
+            <a:extLst>
+              <a:ext uri="{FF2B5EF4-FFF2-40B4-BE49-F238E27FC236}">
+                <a16:creationId xmlns:a16="http://schemas.microsoft.com/office/drawing/2014/main" xmlns="" id="{1709F1D5-B0F1-4714-A239-E5B61C161915}"/>
+              </a:ext>
+              <a:ext uri="{C183D7F6-B498-43B3-948B-1728B52AA6E4}">
+                <adec:decorative xmlns:adec="http://schemas.microsoft.com/office/drawing/2017/decorative" xmlns="" val="1"/>
+              </a:ext>
+            </a:extLst>
+          </p:cNvPr>
+          <p:cNvSpPr>
+            <a:spLocks noGrp="1" noRot="1" noChangeAspect="1" noMove="1" noResize="1" noEditPoints="1" noAdjustHandles="1" noChangeArrowheads="1" noChangeShapeType="1" noTextEdit="1"/>
+          </p:cNvSpPr>
+          <p:nvPr>
+            <p:extLst>
+              <p:ext uri="{386F3935-93C4-4BCD-93E2-E3B085C9AB24}">
+                <p16:designElem xmlns:p16="http://schemas.microsoft.com/office/powerpoint/2015/main" xmlns="" val="1"/>
+              </p:ext>
+            </p:extLst>
+          </p:nvPr>
+        </p:nvSpPr>
+        <p:spPr>
+          <a:xfrm>
+            <a:off x="3048" y="0"/>
+            <a:ext cx="12188952" cy="6858000"/>
+          </a:xfrm>
+          <a:prstGeom prst="rect">
+            <a:avLst/>
+          </a:prstGeom>
+          <a:ln>
+            <a:noFill/>
+          </a:ln>
+        </p:spPr>
+        <p:style>
+          <a:lnRef idx="2">
+            <a:schemeClr val="accent1">
+              <a:shade val="50000"/>
+            </a:schemeClr>
+          </a:lnRef>
+          <a:fillRef idx="1">
+            <a:schemeClr val="accent1"/>
+          </a:fillRef>
+          <a:effectRef idx="0">
+            <a:schemeClr val="accent1"/>
+          </a:effectRef>
+          <a:fontRef idx="minor">
+            <a:schemeClr val="lt1"/>
+          </a:fontRef>
+        </p:style>
+        <p:txBody>
+          <a:bodyPr rtlCol="0" anchor="ctr"/>
+          <a:lstStyle/>
+          <a:p>
+            <a:pPr algn="ctr"/>
+            <a:endParaRPr lang="en-US"/>
+          </a:p>
+        </p:txBody>
+      </p:sp>
+      <p:sp>
+        <p:nvSpPr>
+          <p:cNvPr id="20" name="Rectangle: Rounded Corners 22">
+            <a:extLst>
+              <a:ext uri="{FF2B5EF4-FFF2-40B4-BE49-F238E27FC236}">
+                <a16:creationId xmlns:a16="http://schemas.microsoft.com/office/drawing/2014/main" xmlns="" id="{228FB460-D3FF-4440-A020-05982A09E517}"/>
+              </a:ext>
+              <a:ext uri="{C183D7F6-B498-43B3-948B-1728B52AA6E4}">
+                <adec:decorative xmlns:adec="http://schemas.microsoft.com/office/drawing/2017/decorative" xmlns="" val="1"/>
+              </a:ext>
+            </a:extLst>
+          </p:cNvPr>
+          <p:cNvSpPr>
+            <a:spLocks noGrp="1" noRot="1" noChangeAspect="1" noMove="1" noResize="1" noEditPoints="1" noAdjustHandles="1" noChangeArrowheads="1" noChangeShapeType="1" noTextEdit="1"/>
+          </p:cNvSpPr>
+          <p:nvPr>
+            <p:extLst>
+              <p:ext uri="{386F3935-93C4-4BCD-93E2-E3B085C9AB24}">
+                <p16:designElem xmlns:p16="http://schemas.microsoft.com/office/powerpoint/2015/main" xmlns="" val="1"/>
+              </p:ext>
+            </p:extLst>
+          </p:nvPr>
+        </p:nvSpPr>
+        <p:spPr>
+          <a:xfrm>
+            <a:off x="740546" y="1011045"/>
+            <a:ext cx="4369859" cy="4369859"/>
+          </a:xfrm>
+          <a:prstGeom prst="roundRect">
+            <a:avLst>
+              <a:gd name="adj" fmla="val 2757"/>
+            </a:avLst>
+          </a:prstGeom>
+          <a:solidFill>
+            <a:schemeClr val="accent2"/>
+          </a:solidFill>
+          <a:ln>
+            <a:noFill/>
+          </a:ln>
+        </p:spPr>
+        <p:style>
+          <a:lnRef idx="2">
+            <a:schemeClr val="accent1">
+              <a:shade val="50000"/>
+            </a:schemeClr>
+          </a:lnRef>
+          <a:fillRef idx="1">
+            <a:schemeClr val="accent1"/>
+          </a:fillRef>
+          <a:effectRef idx="0">
+            <a:schemeClr val="accent1"/>
+          </a:effectRef>
+          <a:fontRef idx="minor">
+            <a:schemeClr val="lt1"/>
+          </a:fontRef>
+        </p:style>
+        <p:txBody>
+          <a:bodyPr rtlCol="0" anchor="ctr"/>
+          <a:lstStyle/>
+          <a:p>
+            <a:pPr algn="ctr"/>
+            <a:endParaRPr lang="en-US"/>
+          </a:p>
+        </p:txBody>
+      </p:sp>
+      <p:sp>
+        <p:nvSpPr>
+          <p:cNvPr id="2" name="Título 1">
+            <a:extLst>
+              <a:ext uri="{FF2B5EF4-FFF2-40B4-BE49-F238E27FC236}">
+                <a16:creationId xmlns:a16="http://schemas.microsoft.com/office/drawing/2014/main" xmlns="" id="{FF38BFE4-702E-4DDC-A735-A62269FCC225}"/>
+              </a:ext>
+            </a:extLst>
+          </p:cNvPr>
+          <p:cNvSpPr>
+            <a:spLocks noGrp="1"/>
+          </p:cNvSpPr>
+          <p:nvPr>
+            <p:ph type="title"/>
+          </p:nvPr>
+        </p:nvSpPr>
+        <p:spPr>
+          <a:xfrm>
+            <a:off x="956826" y="1127346"/>
+            <a:ext cx="3937298" cy="4166010"/>
+          </a:xfrm>
+        </p:spPr>
+        <p:txBody>
+          <a:bodyPr>
+            <a:normAutofit/>
+          </a:bodyPr>
+          <a:lstStyle/>
+          <a:p>
+            <a:pPr algn="ctr"/>
+            <a:r>
+              <a:rPr lang="es-ES" sz="4800">
+                <a:solidFill>
+                  <a:srgbClr val="FFFFFF"/>
+                </a:solidFill>
+                <a:cs typeface="Calibri Light"/>
+              </a:rPr>
+              <a:t>Identity</a:t>
+            </a:r>
+          </a:p>
+        </p:txBody>
+      </p:sp>
+      <p:sp>
+        <p:nvSpPr>
+          <p:cNvPr id="22" name="Freeform: Shape 24">
+            <a:extLst>
+              <a:ext uri="{FF2B5EF4-FFF2-40B4-BE49-F238E27FC236}">
+                <a16:creationId xmlns:a16="http://schemas.microsoft.com/office/drawing/2014/main" xmlns="" id="{14847E93-7DC1-4D4B-8829-B19AA7137C50}"/>
+              </a:ext>
+              <a:ext uri="{C183D7F6-B498-43B3-948B-1728B52AA6E4}">
+                <adec:decorative xmlns:adec="http://schemas.microsoft.com/office/drawing/2017/decorative" xmlns="" val="1"/>
+              </a:ext>
+            </a:extLst>
+          </p:cNvPr>
+          <p:cNvSpPr>
+            <a:spLocks noGrp="1" noRot="1" noChangeAspect="1" noMove="1" noResize="1" noEditPoints="1" noAdjustHandles="1" noChangeArrowheads="1" noChangeShapeType="1" noTextEdit="1"/>
+          </p:cNvSpPr>
+          <p:nvPr>
+            <p:extLst>
+              <p:ext uri="{386F3935-93C4-4BCD-93E2-E3B085C9AB24}">
+                <p16:designElem xmlns:p16="http://schemas.microsoft.com/office/powerpoint/2015/main" xmlns="" val="1"/>
+              </p:ext>
+            </p:extLst>
+          </p:nvPr>
+        </p:nvSpPr>
+        <p:spPr>
+          <a:xfrm flipH="1">
+            <a:off x="530529" y="0"/>
+            <a:ext cx="1155142" cy="591009"/>
+          </a:xfrm>
+          <a:custGeom>
+            <a:avLst/>
+            <a:gdLst>
+              <a:gd name="connsiteX0" fmla="*/ 1355 w 1155142"/>
+              <a:gd name="connsiteY0" fmla="*/ 0 h 591009"/>
+              <a:gd name="connsiteX1" fmla="*/ 1153787 w 1155142"/>
+              <a:gd name="connsiteY1" fmla="*/ 0 h 591009"/>
+              <a:gd name="connsiteX2" fmla="*/ 1155142 w 1155142"/>
+              <a:gd name="connsiteY2" fmla="*/ 13438 h 591009"/>
+              <a:gd name="connsiteX3" fmla="*/ 577571 w 1155142"/>
+              <a:gd name="connsiteY3" fmla="*/ 591009 h 591009"/>
+              <a:gd name="connsiteX4" fmla="*/ 0 w 1155142"/>
+              <a:gd name="connsiteY4" fmla="*/ 13438 h 591009"/>
+            </a:gdLst>
+            <a:ahLst/>
+            <a:cxnLst>
+              <a:cxn ang="0">
+                <a:pos x="connsiteX0" y="connsiteY0"/>
+              </a:cxn>
+              <a:cxn ang="0">
+                <a:pos x="connsiteX1" y="connsiteY1"/>
+              </a:cxn>
+              <a:cxn ang="0">
+                <a:pos x="connsiteX2" y="connsiteY2"/>
+              </a:cxn>
+              <a:cxn ang="0">
+                <a:pos x="connsiteX3" y="connsiteY3"/>
+              </a:cxn>
+              <a:cxn ang="0">
+                <a:pos x="connsiteX4" y="connsiteY4"/>
+              </a:cxn>
+            </a:cxnLst>
+            <a:rect l="l" t="t" r="r" b="b"/>
+            <a:pathLst>
+              <a:path w="1155142" h="591009">
+                <a:moveTo>
+                  <a:pt x="1355" y="0"/>
+                </a:moveTo>
+                <a:lnTo>
+                  <a:pt x="1153787" y="0"/>
+                </a:lnTo>
+                <a:lnTo>
+                  <a:pt x="1155142" y="13438"/>
+                </a:lnTo>
+                <a:cubicBezTo>
+                  <a:pt x="1155142" y="332422"/>
+                  <a:pt x="896555" y="591009"/>
+                  <a:pt x="577571" y="591009"/>
+                </a:cubicBezTo>
+                <a:cubicBezTo>
+                  <a:pt x="258587" y="591009"/>
+                  <a:pt x="0" y="332422"/>
+                  <a:pt x="0" y="13438"/>
+                </a:cubicBezTo>
+                <a:close/>
+              </a:path>
+            </a:pathLst>
+          </a:custGeom>
+          <a:solidFill>
+            <a:schemeClr val="accent5"/>
+          </a:solidFill>
+          <a:ln>
+            <a:noFill/>
+          </a:ln>
+        </p:spPr>
+        <p:style>
+          <a:lnRef idx="2">
+            <a:schemeClr val="accent1">
+              <a:shade val="50000"/>
+            </a:schemeClr>
+          </a:lnRef>
+          <a:fillRef idx="1">
+            <a:schemeClr val="accent1"/>
+          </a:fillRef>
+          <a:effectRef idx="0">
+            <a:schemeClr val="accent1"/>
+          </a:effectRef>
+          <a:fontRef idx="minor">
+            <a:schemeClr val="lt1"/>
+          </a:fontRef>
+        </p:style>
+        <p:txBody>
+          <a:bodyPr wrap="square" rtlCol="0" anchor="ctr">
+            <a:noAutofit/>
+          </a:bodyPr>
+          <a:lstStyle/>
+          <a:p>
+            <a:pPr algn="ctr"/>
+            <a:endParaRPr lang="en-US"/>
+          </a:p>
+        </p:txBody>
+      </p:sp>
+      <p:sp>
+        <p:nvSpPr>
+          <p:cNvPr id="27" name="Freeform: Shape 26">
+            <a:extLst>
+              <a:ext uri="{FF2B5EF4-FFF2-40B4-BE49-F238E27FC236}">
+                <a16:creationId xmlns:a16="http://schemas.microsoft.com/office/drawing/2014/main" xmlns="" id="{5566D6E1-03A1-4D73-A4E0-35D74D568A04}"/>
+              </a:ext>
+              <a:ext uri="{C183D7F6-B498-43B3-948B-1728B52AA6E4}">
+                <adec:decorative xmlns:adec="http://schemas.microsoft.com/office/drawing/2017/decorative" xmlns="" val="1"/>
+              </a:ext>
+            </a:extLst>
+          </p:cNvPr>
+          <p:cNvSpPr>
+            <a:spLocks noGrp="1" noRot="1" noChangeAspect="1" noMove="1" noResize="1" noEditPoints="1" noAdjustHandles="1" noChangeArrowheads="1" noChangeShapeType="1" noTextEdit="1"/>
+          </p:cNvSpPr>
+          <p:nvPr>
+            <p:extLst>
+              <p:ext uri="{386F3935-93C4-4BCD-93E2-E3B085C9AB24}">
+                <p16:designElem xmlns:p16="http://schemas.microsoft.com/office/powerpoint/2015/main" xmlns="" val="1"/>
+              </p:ext>
+            </p:extLst>
+          </p:nvPr>
+        </p:nvSpPr>
+        <p:spPr>
+          <a:xfrm flipH="1">
+            <a:off x="3961511" y="-1"/>
+            <a:ext cx="1737401" cy="959536"/>
+          </a:xfrm>
+          <a:custGeom>
+            <a:avLst/>
+            <a:gdLst>
+              <a:gd name="connsiteX0" fmla="*/ 0 w 1737401"/>
+              <a:gd name="connsiteY0" fmla="*/ 0 h 959536"/>
+              <a:gd name="connsiteX1" fmla="*/ 123825 w 1737401"/>
+              <a:gd name="connsiteY1" fmla="*/ 0 h 959536"/>
+              <a:gd name="connsiteX2" fmla="*/ 123825 w 1737401"/>
+              <a:gd name="connsiteY2" fmla="*/ 790277 h 959536"/>
+              <a:gd name="connsiteX3" fmla="*/ 1490095 w 1737401"/>
+              <a:gd name="connsiteY3" fmla="*/ 0 h 959536"/>
+              <a:gd name="connsiteX4" fmla="*/ 1737401 w 1737401"/>
+              <a:gd name="connsiteY4" fmla="*/ 0 h 959536"/>
+              <a:gd name="connsiteX5" fmla="*/ 92869 w 1737401"/>
+              <a:gd name="connsiteY5" fmla="*/ 951249 h 959536"/>
+              <a:gd name="connsiteX6" fmla="*/ 61913 w 1737401"/>
+              <a:gd name="connsiteY6" fmla="*/ 959536 h 959536"/>
+              <a:gd name="connsiteX7" fmla="*/ 0 w 1737401"/>
+              <a:gd name="connsiteY7" fmla="*/ 897624 h 959536"/>
+            </a:gdLst>
+            <a:ahLst/>
+            <a:cxnLst>
+              <a:cxn ang="0">
+                <a:pos x="connsiteX0" y="connsiteY0"/>
+              </a:cxn>
+              <a:cxn ang="0">
+                <a:pos x="connsiteX1" y="connsiteY1"/>
+              </a:cxn>
+              <a:cxn ang="0">
+                <a:pos x="connsiteX2" y="connsiteY2"/>
+              </a:cxn>
+              <a:cxn ang="0">
+                <a:pos x="connsiteX3" y="connsiteY3"/>
+              </a:cxn>
+              <a:cxn ang="0">
+                <a:pos x="connsiteX4" y="connsiteY4"/>
+              </a:cxn>
+              <a:cxn ang="0">
+                <a:pos x="connsiteX5" y="connsiteY5"/>
+              </a:cxn>
+              <a:cxn ang="0">
+                <a:pos x="connsiteX6" y="connsiteY6"/>
+              </a:cxn>
+              <a:cxn ang="0">
+                <a:pos x="connsiteX7" y="connsiteY7"/>
+              </a:cxn>
+            </a:cxnLst>
+            <a:rect l="l" t="t" r="r" b="b"/>
+            <a:pathLst>
+              <a:path w="1737401" h="959536">
+                <a:moveTo>
+                  <a:pt x="0" y="0"/>
+                </a:moveTo>
+                <a:lnTo>
+                  <a:pt x="123825" y="0"/>
+                </a:lnTo>
+                <a:lnTo>
+                  <a:pt x="123825" y="790277"/>
+                </a:lnTo>
+                <a:lnTo>
+                  <a:pt x="1490095" y="0"/>
+                </a:lnTo>
+                <a:lnTo>
+                  <a:pt x="1737401" y="0"/>
+                </a:lnTo>
+                <a:lnTo>
+                  <a:pt x="92869" y="951249"/>
+                </a:lnTo>
+                <a:cubicBezTo>
+                  <a:pt x="83458" y="956688"/>
+                  <a:pt x="72780" y="959546"/>
+                  <a:pt x="61913" y="959536"/>
+                </a:cubicBezTo>
+                <a:cubicBezTo>
+                  <a:pt x="27719" y="959536"/>
+                  <a:pt x="0" y="931818"/>
+                  <a:pt x="0" y="897624"/>
+                </a:cubicBezTo>
+                <a:close/>
+              </a:path>
+            </a:pathLst>
+          </a:custGeom>
+          <a:solidFill>
+            <a:schemeClr val="accent6"/>
+          </a:solidFill>
+          <a:ln w="9525" cap="flat">
+            <a:noFill/>
+            <a:prstDash val="solid"/>
+            <a:miter/>
+          </a:ln>
+        </p:spPr>
+        <p:txBody>
+          <a:bodyPr rtlCol="0" anchor="ctr"/>
+          <a:lstStyle/>
+          <a:p>
+            <a:endParaRPr lang="en-US"/>
+          </a:p>
+        </p:txBody>
+      </p:sp>
+      <p:sp>
+        <p:nvSpPr>
+          <p:cNvPr id="29" name="Freeform: Shape 28">
+            <a:extLst>
+              <a:ext uri="{FF2B5EF4-FFF2-40B4-BE49-F238E27FC236}">
+                <a16:creationId xmlns:a16="http://schemas.microsoft.com/office/drawing/2014/main" xmlns="" id="{9F835A99-04AC-494A-A572-AFE8413CC938}"/>
+              </a:ext>
+              <a:ext uri="{C183D7F6-B498-43B3-948B-1728B52AA6E4}">
+                <adec:decorative xmlns:adec="http://schemas.microsoft.com/office/drawing/2017/decorative" xmlns="" val="1"/>
+              </a:ext>
+            </a:extLst>
+          </p:cNvPr>
+          <p:cNvSpPr>
+            <a:spLocks noGrp="1" noRot="1" noChangeAspect="1" noMove="1" noResize="1" noEditPoints="1" noAdjustHandles="1" noChangeArrowheads="1" noChangeShapeType="1" noTextEdit="1"/>
+          </p:cNvSpPr>
+          <p:nvPr>
+            <p:extLst>
+              <p:ext uri="{386F3935-93C4-4BCD-93E2-E3B085C9AB24}">
+                <p16:designElem xmlns:p16="http://schemas.microsoft.com/office/powerpoint/2015/main" xmlns="" val="1"/>
+              </p:ext>
+            </p:extLst>
+          </p:nvPr>
+        </p:nvSpPr>
+        <p:spPr>
+          <a:xfrm flipH="1">
+            <a:off x="0" y="2936831"/>
+            <a:ext cx="159741" cy="552996"/>
+          </a:xfrm>
+          <a:custGeom>
+            <a:avLst/>
+            <a:gdLst>
+              <a:gd name="connsiteX0" fmla="*/ 159741 w 159741"/>
+              <a:gd name="connsiteY0" fmla="*/ 0 h 552996"/>
+              <a:gd name="connsiteX1" fmla="*/ 159741 w 159741"/>
+              <a:gd name="connsiteY1" fmla="*/ 552996 h 552996"/>
+              <a:gd name="connsiteX2" fmla="*/ 141849 w 159741"/>
+              <a:gd name="connsiteY2" fmla="*/ 543285 h 552996"/>
+              <a:gd name="connsiteX3" fmla="*/ 0 w 159741"/>
+              <a:gd name="connsiteY3" fmla="*/ 276498 h 552996"/>
+              <a:gd name="connsiteX4" fmla="*/ 141849 w 159741"/>
+              <a:gd name="connsiteY4" fmla="*/ 9711 h 552996"/>
+            </a:gdLst>
+            <a:ahLst/>
+            <a:cxnLst>
+              <a:cxn ang="0">
+                <a:pos x="connsiteX0" y="connsiteY0"/>
+              </a:cxn>
+              <a:cxn ang="0">
+                <a:pos x="connsiteX1" y="connsiteY1"/>
+              </a:cxn>
+              <a:cxn ang="0">
+                <a:pos x="connsiteX2" y="connsiteY2"/>
+              </a:cxn>
+              <a:cxn ang="0">
+                <a:pos x="connsiteX3" y="connsiteY3"/>
+              </a:cxn>
+              <a:cxn ang="0">
+                <a:pos x="connsiteX4" y="connsiteY4"/>
+              </a:cxn>
+            </a:cxnLst>
+            <a:rect l="l" t="t" r="r" b="b"/>
+            <a:pathLst>
+              <a:path w="159741" h="552996">
+                <a:moveTo>
+                  <a:pt x="159741" y="0"/>
+                </a:moveTo>
+                <a:lnTo>
+                  <a:pt x="159741" y="552996"/>
+                </a:lnTo>
+                <a:lnTo>
+                  <a:pt x="141849" y="543285"/>
+                </a:lnTo>
+                <a:cubicBezTo>
+                  <a:pt x="56268" y="485467"/>
+                  <a:pt x="0" y="387554"/>
+                  <a:pt x="0" y="276498"/>
+                </a:cubicBezTo>
+                <a:cubicBezTo>
+                  <a:pt x="0" y="165443"/>
+                  <a:pt x="56268" y="67529"/>
+                  <a:pt x="141849" y="9711"/>
+                </a:cubicBezTo>
+                <a:close/>
+              </a:path>
+            </a:pathLst>
+          </a:custGeom>
+          <a:solidFill>
+            <a:schemeClr val="accent4"/>
+          </a:solidFill>
+          <a:ln w="127000">
+            <a:noFill/>
+          </a:ln>
+        </p:spPr>
+        <p:style>
+          <a:lnRef idx="2">
+            <a:schemeClr val="accent1">
+              <a:shade val="50000"/>
+            </a:schemeClr>
+          </a:lnRef>
+          <a:fillRef idx="1">
+            <a:schemeClr val="accent1"/>
+          </a:fillRef>
+          <a:effectRef idx="0">
+            <a:schemeClr val="accent1"/>
+          </a:effectRef>
+          <a:fontRef idx="minor">
+            <a:schemeClr val="lt1"/>
+          </a:fontRef>
+        </p:style>
+        <p:txBody>
+          <a:bodyPr wrap="square" rtlCol="0" anchor="ctr">
+            <a:noAutofit/>
+          </a:bodyPr>
+          <a:lstStyle/>
+          <a:p>
+            <a:pPr algn="ctr"/>
+            <a:endParaRPr lang="en-US"/>
+          </a:p>
+        </p:txBody>
+      </p:sp>
+      <p:sp>
+        <p:nvSpPr>
+          <p:cNvPr id="3" name="Marcador de contenido 2">
+            <a:extLst>
+              <a:ext uri="{FF2B5EF4-FFF2-40B4-BE49-F238E27FC236}">
+                <a16:creationId xmlns:a16="http://schemas.microsoft.com/office/drawing/2014/main" xmlns="" id="{941603E7-BE6F-472A-9218-4C0E852BD664}"/>
+              </a:ext>
+            </a:extLst>
+          </p:cNvPr>
+          <p:cNvSpPr>
+            <a:spLocks noGrp="1"/>
+          </p:cNvSpPr>
+          <p:nvPr>
+            <p:ph idx="1"/>
+          </p:nvPr>
+        </p:nvSpPr>
+        <p:spPr>
+          <a:xfrm>
+            <a:off x="6095999" y="1683522"/>
+            <a:ext cx="5257799" cy="3494743"/>
+          </a:xfrm>
+        </p:spPr>
+        <p:txBody>
+          <a:bodyPr vert="horz" lIns="91440" tIns="45720" rIns="91440" bIns="45720" rtlCol="0" anchor="t">
+            <a:noAutofit/>
+          </a:bodyPr>
+          <a:lstStyle/>
+          <a:p>
+            <a:pPr algn="just">
+              <a:buFont typeface="Arial"/>
+            </a:pPr>
+            <a:r>
+              <a:rPr lang="pt" sz="3200">
+                <a:ea typeface="+mn-lt"/>
+                <a:cs typeface="+mn-lt"/>
+              </a:rPr>
+              <a:t>Identity é uma propriedade utilizada para atributos (campos/colunas) das tabelas nas funções CREATE TABLE e ALTER TABLE, e tem como finalidade incrementar um valor a cada nova inserção.</a:t>
+            </a:r>
+            <a:endParaRPr lang="es-ES" sz="3200"/>
+          </a:p>
+          <a:p>
+            <a:pPr>
+              <a:buFont typeface="Arial"/>
+              <a:buChar char="•"/>
+            </a:pPr>
+            <a:endParaRPr lang="pt" dirty="0">
+              <a:ea typeface="+mn-lt"/>
+              <a:cs typeface="+mn-lt"/>
+            </a:endParaRPr>
+          </a:p>
+          <a:p>
+            <a:pPr marL="0" indent="0">
+              <a:buNone/>
+            </a:pPr>
+            <a:endParaRPr lang="pt" dirty="0">
+              <a:cs typeface="Calibri" panose="020F0502020204030204"/>
+            </a:endParaRPr>
+          </a:p>
+          <a:p>
+            <a:pPr>
+              <a:buFont typeface="Arial"/>
+              <a:buChar char="•"/>
+            </a:pPr>
+            <a:endParaRPr lang="es-ES" dirty="0">
+              <a:cs typeface="Calibri" panose="020F0502020204030204"/>
+            </a:endParaRPr>
+          </a:p>
+          <a:p>
+            <a:pPr algn="just">
+              <a:buFont typeface="Arial"/>
+              <a:buChar char="•"/>
+            </a:pPr>
+            <a:endParaRPr lang="es-ES">
+              <a:cs typeface="Calibri" panose="020F0502020204030204"/>
+            </a:endParaRPr>
+          </a:p>
+        </p:txBody>
+      </p:sp>
+      <p:sp>
+        <p:nvSpPr>
+          <p:cNvPr id="31" name="Freeform: Shape 30">
+            <a:extLst>
+              <a:ext uri="{FF2B5EF4-FFF2-40B4-BE49-F238E27FC236}">
+                <a16:creationId xmlns:a16="http://schemas.microsoft.com/office/drawing/2014/main" xmlns="" id="{7B786209-1B0B-4CA9-9BDD-F7327066A84D}"/>
+              </a:ext>
+              <a:ext uri="{C183D7F6-B498-43B3-948B-1728B52AA6E4}">
+                <adec:decorative xmlns:adec="http://schemas.microsoft.com/office/drawing/2017/decorative" xmlns="" val="1"/>
+              </a:ext>
+            </a:extLst>
+          </p:cNvPr>
+          <p:cNvSpPr>
+            <a:spLocks noGrp="1" noRot="1" noChangeAspect="1" noMove="1" noResize="1" noEditPoints="1" noAdjustHandles="1" noChangeArrowheads="1" noChangeShapeType="1" noTextEdit="1"/>
+          </p:cNvSpPr>
+          <p:nvPr>
+            <p:extLst>
+              <p:ext uri="{386F3935-93C4-4BCD-93E2-E3B085C9AB24}">
+                <p16:designElem xmlns:p16="http://schemas.microsoft.com/office/powerpoint/2015/main" xmlns="" val="1"/>
+              </p:ext>
+            </p:extLst>
+          </p:nvPr>
+        </p:nvSpPr>
+        <p:spPr>
+          <a:xfrm flipH="1">
+            <a:off x="0" y="5835649"/>
+            <a:ext cx="1548180" cy="1022351"/>
+          </a:xfrm>
+          <a:custGeom>
+            <a:avLst/>
+            <a:gdLst>
+              <a:gd name="connsiteX0" fmla="*/ 61913 w 1548180"/>
+              <a:gd name="connsiteY0" fmla="*/ 0 h 1022351"/>
+              <a:gd name="connsiteX1" fmla="*/ 1548180 w 1548180"/>
+              <a:gd name="connsiteY1" fmla="*/ 0 h 1022351"/>
+              <a:gd name="connsiteX2" fmla="*/ 1548180 w 1548180"/>
+              <a:gd name="connsiteY2" fmla="*/ 123825 h 1022351"/>
+              <a:gd name="connsiteX3" fmla="*/ 123825 w 1548180"/>
+              <a:gd name="connsiteY3" fmla="*/ 123825 h 1022351"/>
+              <a:gd name="connsiteX4" fmla="*/ 123825 w 1548180"/>
+              <a:gd name="connsiteY4" fmla="*/ 1022351 h 1022351"/>
+              <a:gd name="connsiteX5" fmla="*/ 0 w 1548180"/>
+              <a:gd name="connsiteY5" fmla="*/ 1022351 h 1022351"/>
+              <a:gd name="connsiteX6" fmla="*/ 0 w 1548180"/>
+              <a:gd name="connsiteY6" fmla="*/ 61913 h 1022351"/>
+              <a:gd name="connsiteX7" fmla="*/ 61913 w 1548180"/>
+              <a:gd name="connsiteY7" fmla="*/ 0 h 1022351"/>
+            </a:gdLst>
+            <a:ahLst/>
+            <a:cxnLst>
+              <a:cxn ang="0">
+                <a:pos x="connsiteX0" y="connsiteY0"/>
+              </a:cxn>
+              <a:cxn ang="0">
+                <a:pos x="connsiteX1" y="connsiteY1"/>
+              </a:cxn>
+              <a:cxn ang="0">
+                <a:pos x="connsiteX2" y="connsiteY2"/>
+              </a:cxn>
+              <a:cxn ang="0">
+                <a:pos x="connsiteX3" y="connsiteY3"/>
+              </a:cxn>
+              <a:cxn ang="0">
+                <a:pos x="connsiteX4" y="connsiteY4"/>
+              </a:cxn>
+              <a:cxn ang="0">
+                <a:pos x="connsiteX5" y="connsiteY5"/>
+              </a:cxn>
+              <a:cxn ang="0">
+                <a:pos x="connsiteX6" y="connsiteY6"/>
+              </a:cxn>
+              <a:cxn ang="0">
+                <a:pos x="connsiteX7" y="connsiteY7"/>
+              </a:cxn>
+            </a:cxnLst>
+            <a:rect l="l" t="t" r="r" b="b"/>
+            <a:pathLst>
+              <a:path w="1548180" h="1022351">
+                <a:moveTo>
+                  <a:pt x="61913" y="0"/>
+                </a:moveTo>
+                <a:lnTo>
+                  <a:pt x="1548180" y="0"/>
+                </a:lnTo>
+                <a:lnTo>
+                  <a:pt x="1548180" y="123825"/>
+                </a:lnTo>
+                <a:lnTo>
+                  <a:pt x="123825" y="123825"/>
+                </a:lnTo>
+                <a:lnTo>
+                  <a:pt x="123825" y="1022351"/>
+                </a:lnTo>
+                <a:lnTo>
+                  <a:pt x="0" y="1022351"/>
+                </a:lnTo>
+                <a:lnTo>
+                  <a:pt x="0" y="61913"/>
+                </a:lnTo>
+                <a:cubicBezTo>
+                  <a:pt x="0" y="27719"/>
+                  <a:pt x="27719" y="0"/>
+                  <a:pt x="61913" y="0"/>
+                </a:cubicBezTo>
+                <a:close/>
+              </a:path>
+            </a:pathLst>
+          </a:custGeom>
+          <a:solidFill>
+            <a:schemeClr val="accent6"/>
+          </a:solidFill>
+          <a:ln w="9525" cap="flat">
+            <a:noFill/>
+            <a:prstDash val="solid"/>
+            <a:miter/>
+          </a:ln>
+        </p:spPr>
+        <p:txBody>
+          <a:bodyPr rtlCol="0" anchor="ctr"/>
+          <a:lstStyle/>
+          <a:p>
+            <a:endParaRPr lang="en-US"/>
+          </a:p>
+        </p:txBody>
+      </p:sp>
+      <p:sp>
+        <p:nvSpPr>
+          <p:cNvPr id="33" name="Freeform: Shape 32">
+            <a:extLst>
+              <a:ext uri="{FF2B5EF4-FFF2-40B4-BE49-F238E27FC236}">
+                <a16:creationId xmlns:a16="http://schemas.microsoft.com/office/drawing/2014/main" xmlns="" id="{2D2964BB-484D-45AE-AD66-D407D0629652}"/>
+              </a:ext>
+              <a:ext uri="{C183D7F6-B498-43B3-948B-1728B52AA6E4}">
+                <adec:decorative xmlns:adec="http://schemas.microsoft.com/office/drawing/2017/decorative" xmlns="" val="1"/>
+              </a:ext>
+            </a:extLst>
+          </p:cNvPr>
+          <p:cNvSpPr>
+            <a:spLocks noGrp="1" noRot="1" noChangeAspect="1" noMove="1" noResize="1" noEditPoints="1" noAdjustHandles="1" noChangeArrowheads="1" noChangeShapeType="1" noTextEdit="1"/>
+          </p:cNvSpPr>
+          <p:nvPr>
+            <p:extLst>
+              <p:ext uri="{386F3935-93C4-4BCD-93E2-E3B085C9AB24}">
+                <p16:designElem xmlns:p16="http://schemas.microsoft.com/office/powerpoint/2015/main" xmlns="" val="1"/>
+              </p:ext>
+            </p:extLst>
+          </p:nvPr>
+        </p:nvSpPr>
+        <p:spPr>
+          <a:xfrm flipH="1">
+            <a:off x="3418308" y="5717905"/>
+            <a:ext cx="1771609" cy="1140095"/>
+          </a:xfrm>
+          <a:custGeom>
+            <a:avLst/>
+            <a:gdLst>
+              <a:gd name="connsiteX0" fmla="*/ 1561721 w 1771609"/>
+              <a:gd name="connsiteY0" fmla="*/ 763041 h 1140095"/>
+              <a:gd name="connsiteX1" fmla="*/ 1623024 w 1771609"/>
+              <a:gd name="connsiteY1" fmla="*/ 792810 h 1140095"/>
+              <a:gd name="connsiteX2" fmla="*/ 1711735 w 1771609"/>
+              <a:gd name="connsiteY2" fmla="*/ 970132 h 1140095"/>
+              <a:gd name="connsiteX3" fmla="*/ 1771609 w 1771609"/>
+              <a:gd name="connsiteY3" fmla="*/ 1140095 h 1140095"/>
+              <a:gd name="connsiteX4" fmla="*/ 1637225 w 1771609"/>
+              <a:gd name="connsiteY4" fmla="*/ 1140095 h 1140095"/>
+              <a:gd name="connsiteX5" fmla="*/ 1594820 w 1771609"/>
+              <a:gd name="connsiteY5" fmla="*/ 1019711 h 1140095"/>
+              <a:gd name="connsiteX6" fmla="*/ 1513200 w 1771609"/>
+              <a:gd name="connsiteY6" fmla="*/ 856627 h 1140095"/>
+              <a:gd name="connsiteX7" fmla="*/ 1538499 w 1771609"/>
+              <a:gd name="connsiteY7" fmla="*/ 770415 h 1140095"/>
+              <a:gd name="connsiteX8" fmla="*/ 1561721 w 1771609"/>
+              <a:gd name="connsiteY8" fmla="*/ 763041 h 1140095"/>
+              <a:gd name="connsiteX9" fmla="*/ 933455 w 1771609"/>
+              <a:gd name="connsiteY9" fmla="*/ 161309 h 1140095"/>
+              <a:gd name="connsiteX10" fmla="*/ 957797 w 1771609"/>
+              <a:gd name="connsiteY10" fmla="*/ 167970 h 1140095"/>
+              <a:gd name="connsiteX11" fmla="*/ 1286982 w 1771609"/>
+              <a:gd name="connsiteY11" fmla="*/ 387616 h 1140095"/>
+              <a:gd name="connsiteX12" fmla="*/ 1293725 w 1771609"/>
+              <a:gd name="connsiteY12" fmla="*/ 477075 h 1140095"/>
+              <a:gd name="connsiteX13" fmla="*/ 1245453 w 1771609"/>
+              <a:gd name="connsiteY13" fmla="*/ 499154 h 1140095"/>
+              <a:gd name="connsiteX14" fmla="*/ 1245167 w 1771609"/>
+              <a:gd name="connsiteY14" fmla="*/ 499154 h 1140095"/>
+              <a:gd name="connsiteX15" fmla="*/ 1203638 w 1771609"/>
+              <a:gd name="connsiteY15" fmla="*/ 484104 h 1140095"/>
+              <a:gd name="connsiteX16" fmla="*/ 900647 w 1771609"/>
+              <a:gd name="connsiteY16" fmla="*/ 281508 h 1140095"/>
+              <a:gd name="connsiteX17" fmla="*/ 872454 w 1771609"/>
+              <a:gd name="connsiteY17" fmla="*/ 196164 h 1140095"/>
+              <a:gd name="connsiteX18" fmla="*/ 933455 w 1771609"/>
+              <a:gd name="connsiteY18" fmla="*/ 161309 h 1140095"/>
+              <a:gd name="connsiteX19" fmla="*/ 256260 w 1771609"/>
+              <a:gd name="connsiteY19" fmla="*/ 29 h 1140095"/>
+              <a:gd name="connsiteX20" fmla="*/ 454020 w 1771609"/>
+              <a:gd name="connsiteY20" fmla="*/ 13474 h 1140095"/>
+              <a:gd name="connsiteX21" fmla="*/ 509236 w 1771609"/>
+              <a:gd name="connsiteY21" fmla="*/ 84182 h 1140095"/>
+              <a:gd name="connsiteX22" fmla="*/ 445829 w 1771609"/>
+              <a:gd name="connsiteY22" fmla="*/ 139871 h 1140095"/>
+              <a:gd name="connsiteX23" fmla="*/ 437447 w 1771609"/>
+              <a:gd name="connsiteY23" fmla="*/ 139395 h 1140095"/>
+              <a:gd name="connsiteX24" fmla="*/ 73211 w 1771609"/>
+              <a:gd name="connsiteY24" fmla="*/ 137204 h 1140095"/>
+              <a:gd name="connsiteX25" fmla="*/ 749 w 1771609"/>
+              <a:gd name="connsiteY25" fmla="*/ 84082 h 1140095"/>
+              <a:gd name="connsiteX26" fmla="*/ 53871 w 1771609"/>
+              <a:gd name="connsiteY26" fmla="*/ 11621 h 1140095"/>
+              <a:gd name="connsiteX27" fmla="*/ 58352 w 1771609"/>
+              <a:gd name="connsiteY27" fmla="*/ 11093 h 1140095"/>
+              <a:gd name="connsiteX28" fmla="*/ 256260 w 1771609"/>
+              <a:gd name="connsiteY28" fmla="*/ 29 h 1140095"/>
+            </a:gdLst>
+            <a:ahLst/>
+            <a:cxnLst>
+              <a:cxn ang="0">
+                <a:pos x="connsiteX0" y="connsiteY0"/>
+              </a:cxn>
+              <a:cxn ang="0">
+                <a:pos x="connsiteX1" y="connsiteY1"/>
+              </a:cxn>
+              <a:cxn ang="0">
+                <a:pos x="connsiteX2" y="connsiteY2"/>
+              </a:cxn>
+              <a:cxn ang="0">
+                <a:pos x="connsiteX3" y="connsiteY3"/>
+              </a:cxn>
+              <a:cxn ang="0">
+                <a:pos x="connsiteX4" y="connsiteY4"/>
+              </a:cxn>
+              <a:cxn ang="0">
+                <a:pos x="connsiteX5" y="connsiteY5"/>
+              </a:cxn>
+              <a:cxn ang="0">
+                <a:pos x="connsiteX6" y="connsiteY6"/>
+              </a:cxn>
+              <a:cxn ang="0">
+                <a:pos x="connsiteX7" y="connsiteY7"/>
+              </a:cxn>
+              <a:cxn ang="0">
+                <a:pos x="connsiteX8" y="connsiteY8"/>
+              </a:cxn>
+              <a:cxn ang="0">
+                <a:pos x="connsiteX9" y="connsiteY9"/>
+              </a:cxn>
+              <a:cxn ang="0">
+                <a:pos x="connsiteX10" y="connsiteY10"/>
+              </a:cxn>
+              <a:cxn ang="0">
+                <a:pos x="connsiteX11" y="connsiteY11"/>
+              </a:cxn>
+              <a:cxn ang="0">
+                <a:pos x="connsiteX12" y="connsiteY12"/>
+              </a:cxn>
+              <a:cxn ang="0">
+                <a:pos x="connsiteX13" y="connsiteY13"/>
+              </a:cxn>
+              <a:cxn ang="0">
+                <a:pos x="connsiteX14" y="connsiteY14"/>
+              </a:cxn>
+              <a:cxn ang="0">
+                <a:pos x="connsiteX15" y="connsiteY15"/>
+              </a:cxn>
+              <a:cxn ang="0">
+                <a:pos x="connsiteX16" y="connsiteY16"/>
+              </a:cxn>
+              <a:cxn ang="0">
+                <a:pos x="connsiteX17" y="connsiteY17"/>
+              </a:cxn>
+              <a:cxn ang="0">
+                <a:pos x="connsiteX18" y="connsiteY18"/>
+              </a:cxn>
+              <a:cxn ang="0">
+                <a:pos x="connsiteX19" y="connsiteY19"/>
+              </a:cxn>
+              <a:cxn ang="0">
+                <a:pos x="connsiteX20" y="connsiteY20"/>
+              </a:cxn>
+              <a:cxn ang="0">
+                <a:pos x="connsiteX21" y="connsiteY21"/>
+              </a:cxn>
+              <a:cxn ang="0">
+                <a:pos x="connsiteX22" y="connsiteY22"/>
+              </a:cxn>
+              <a:cxn ang="0">
+                <a:pos x="connsiteX23" y="connsiteY23"/>
+              </a:cxn>
+              <a:cxn ang="0">
+                <a:pos x="connsiteX24" y="connsiteY24"/>
+              </a:cxn>
+              <a:cxn ang="0">
+                <a:pos x="connsiteX25" y="connsiteY25"/>
+              </a:cxn>
+              <a:cxn ang="0">
+                <a:pos x="connsiteX26" y="connsiteY26"/>
+              </a:cxn>
+              <a:cxn ang="0">
+                <a:pos x="connsiteX27" y="connsiteY27"/>
+              </a:cxn>
+              <a:cxn ang="0">
+                <a:pos x="connsiteX28" y="connsiteY28"/>
+              </a:cxn>
+            </a:cxnLst>
+            <a:rect l="l" t="t" r="r" b="b"/>
+            <a:pathLst>
+              <a:path w="1771609" h="1140095">
+                <a:moveTo>
+                  <a:pt x="1561721" y="763041"/>
+                </a:moveTo>
+                <a:cubicBezTo>
+                  <a:pt x="1585506" y="760324"/>
+                  <a:pt x="1609722" y="771249"/>
+                  <a:pt x="1623024" y="792810"/>
+                </a:cubicBezTo>
+                <a:cubicBezTo>
+                  <a:pt x="1656300" y="850065"/>
+                  <a:pt x="1685920" y="909291"/>
+                  <a:pt x="1711735" y="970132"/>
+                </a:cubicBezTo>
+                <a:lnTo>
+                  <a:pt x="1771609" y="1140095"/>
+                </a:lnTo>
+                <a:lnTo>
+                  <a:pt x="1637225" y="1140095"/>
+                </a:lnTo>
+                <a:lnTo>
+                  <a:pt x="1594820" y="1019711"/>
+                </a:lnTo>
+                <a:cubicBezTo>
+                  <a:pt x="1571072" y="963753"/>
+                  <a:pt x="1543818" y="909282"/>
+                  <a:pt x="1513200" y="856627"/>
+                </a:cubicBezTo>
+                <a:cubicBezTo>
+                  <a:pt x="1496379" y="825834"/>
+                  <a:pt x="1507704" y="787236"/>
+                  <a:pt x="1538499" y="770415"/>
+                </a:cubicBezTo>
+                <a:cubicBezTo>
+                  <a:pt x="1545912" y="766367"/>
+                  <a:pt x="1553792" y="763946"/>
+                  <a:pt x="1561721" y="763041"/>
+                </a:cubicBezTo>
+                <a:close/>
+                <a:moveTo>
+                  <a:pt x="933455" y="161309"/>
+                </a:moveTo>
+                <a:cubicBezTo>
+                  <a:pt x="941693" y="161855"/>
+                  <a:pt x="949959" y="164025"/>
+                  <a:pt x="957797" y="167970"/>
+                </a:cubicBezTo>
+                <a:cubicBezTo>
+                  <a:pt x="1076184" y="227289"/>
+                  <a:pt x="1186759" y="301068"/>
+                  <a:pt x="1286982" y="387616"/>
+                </a:cubicBezTo>
+                <a:cubicBezTo>
+                  <a:pt x="1313547" y="410457"/>
+                  <a:pt x="1316566" y="450510"/>
+                  <a:pt x="1293725" y="477075"/>
+                </a:cubicBezTo>
+                <a:cubicBezTo>
+                  <a:pt x="1281638" y="491137"/>
+                  <a:pt x="1263998" y="499204"/>
+                  <a:pt x="1245453" y="499154"/>
+                </a:cubicBezTo>
+                <a:lnTo>
+                  <a:pt x="1245167" y="499154"/>
+                </a:lnTo>
+                <a:cubicBezTo>
+                  <a:pt x="1229965" y="499301"/>
+                  <a:pt x="1215220" y="493956"/>
+                  <a:pt x="1203638" y="484104"/>
+                </a:cubicBezTo>
+                <a:cubicBezTo>
+                  <a:pt x="1111407" y="404300"/>
+                  <a:pt x="1009633" y="336248"/>
+                  <a:pt x="900647" y="281508"/>
+                </a:cubicBezTo>
+                <a:cubicBezTo>
+                  <a:pt x="869295" y="265726"/>
+                  <a:pt x="856672" y="227516"/>
+                  <a:pt x="872454" y="196164"/>
+                </a:cubicBezTo>
+                <a:cubicBezTo>
+                  <a:pt x="884290" y="172650"/>
+                  <a:pt x="908742" y="159670"/>
+                  <a:pt x="933455" y="161309"/>
+                </a:cubicBezTo>
+                <a:close/>
+                <a:moveTo>
+                  <a:pt x="256260" y="29"/>
+                </a:moveTo>
+                <a:cubicBezTo>
+                  <a:pt x="322331" y="427"/>
+                  <a:pt x="388378" y="4909"/>
+                  <a:pt x="454020" y="13474"/>
+                </a:cubicBezTo>
+                <a:cubicBezTo>
+                  <a:pt x="488793" y="17752"/>
+                  <a:pt x="513514" y="49409"/>
+                  <a:pt x="509236" y="84182"/>
+                </a:cubicBezTo>
+                <a:cubicBezTo>
+                  <a:pt x="505303" y="116151"/>
+                  <a:pt x="478038" y="140098"/>
+                  <a:pt x="445829" y="139871"/>
+                </a:cubicBezTo>
+                <a:cubicBezTo>
+                  <a:pt x="443027" y="139899"/>
+                  <a:pt x="440227" y="139740"/>
+                  <a:pt x="437447" y="139395"/>
+                </a:cubicBezTo>
+                <a:cubicBezTo>
+                  <a:pt x="316592" y="123615"/>
+                  <a:pt x="194247" y="122878"/>
+                  <a:pt x="73211" y="137204"/>
+                </a:cubicBezTo>
+                <a:cubicBezTo>
+                  <a:pt x="38532" y="142545"/>
+                  <a:pt x="6090" y="118762"/>
+                  <a:pt x="749" y="84082"/>
+                </a:cubicBezTo>
+                <a:cubicBezTo>
+                  <a:pt x="-4591" y="49403"/>
+                  <a:pt x="19192" y="16961"/>
+                  <a:pt x="53871" y="11621"/>
+                </a:cubicBezTo>
+                <a:cubicBezTo>
+                  <a:pt x="55358" y="11392"/>
+                  <a:pt x="56852" y="11216"/>
+                  <a:pt x="58352" y="11093"/>
+                </a:cubicBezTo>
+                <a:cubicBezTo>
+                  <a:pt x="124093" y="3319"/>
+                  <a:pt x="190189" y="-369"/>
+                  <a:pt x="256260" y="29"/>
+                </a:cubicBezTo>
+                <a:close/>
+              </a:path>
+            </a:pathLst>
+          </a:custGeom>
+          <a:solidFill>
+            <a:schemeClr val="accent4"/>
+          </a:solidFill>
+          <a:ln w="9525" cap="flat">
+            <a:noFill/>
+            <a:prstDash val="solid"/>
+            <a:miter/>
+          </a:ln>
+        </p:spPr>
+        <p:txBody>
+          <a:bodyPr rtlCol="0" anchor="ctr"/>
+          <a:lstStyle/>
+          <a:p>
+            <a:endParaRPr lang="en-US"/>
+          </a:p>
+        </p:txBody>
+      </p:sp>
+      <p:sp>
+        <p:nvSpPr>
+          <p:cNvPr id="35" name="Freeform: Shape 34">
+            <a:extLst>
+              <a:ext uri="{FF2B5EF4-FFF2-40B4-BE49-F238E27FC236}">
+                <a16:creationId xmlns:a16="http://schemas.microsoft.com/office/drawing/2014/main" xmlns="" id="{6691AC69-A76E-4DAB-B565-468B6B87ACF3}"/>
+              </a:ext>
+              <a:ext uri="{C183D7F6-B498-43B3-948B-1728B52AA6E4}">
+                <adec:decorative xmlns:adec="http://schemas.microsoft.com/office/drawing/2017/decorative" xmlns="" val="1"/>
+              </a:ext>
+            </a:extLst>
+          </p:cNvPr>
+          <p:cNvSpPr>
+            <a:spLocks noGrp="1" noRot="1" noChangeAspect="1" noMove="1" noResize="1" noEditPoints="1" noAdjustHandles="1" noChangeArrowheads="1" noChangeShapeType="1" noTextEdit="1"/>
+          </p:cNvSpPr>
+          <p:nvPr>
+            <p:extLst>
+              <p:ext uri="{386F3935-93C4-4BCD-93E2-E3B085C9AB24}">
+                <p16:designElem xmlns:p16="http://schemas.microsoft.com/office/powerpoint/2015/main" xmlns="" val="1"/>
+              </p:ext>
+            </p:extLst>
+          </p:nvPr>
+        </p:nvSpPr>
+        <p:spPr>
+          <a:xfrm flipH="1">
+            <a:off x="4132972" y="6258755"/>
+            <a:ext cx="1565940" cy="599245"/>
+          </a:xfrm>
+          <a:custGeom>
+            <a:avLst/>
+            <a:gdLst>
+              <a:gd name="connsiteX0" fmla="*/ 782970 w 1565940"/>
+              <a:gd name="connsiteY0" fmla="*/ 0 h 599245"/>
+              <a:gd name="connsiteX1" fmla="*/ 1528042 w 1565940"/>
+              <a:gd name="connsiteY1" fmla="*/ 480469 h 599245"/>
+              <a:gd name="connsiteX2" fmla="*/ 1565940 w 1565940"/>
+              <a:gd name="connsiteY2" fmla="*/ 599245 h 599245"/>
+              <a:gd name="connsiteX3" fmla="*/ 0 w 1565940"/>
+              <a:gd name="connsiteY3" fmla="*/ 599245 h 599245"/>
+              <a:gd name="connsiteX4" fmla="*/ 37898 w 1565940"/>
+              <a:gd name="connsiteY4" fmla="*/ 480469 h 599245"/>
+              <a:gd name="connsiteX5" fmla="*/ 782970 w 1565940"/>
+              <a:gd name="connsiteY5" fmla="*/ 0 h 599245"/>
+            </a:gdLst>
+            <a:ahLst/>
+            <a:cxnLst>
+              <a:cxn ang="0">
+                <a:pos x="connsiteX0" y="connsiteY0"/>
+              </a:cxn>
+              <a:cxn ang="0">
+                <a:pos x="connsiteX1" y="connsiteY1"/>
+              </a:cxn>
+              <a:cxn ang="0">
+                <a:pos x="connsiteX2" y="connsiteY2"/>
+              </a:cxn>
+              <a:cxn ang="0">
+                <a:pos x="connsiteX3" y="connsiteY3"/>
+              </a:cxn>
+              <a:cxn ang="0">
+                <a:pos x="connsiteX4" y="connsiteY4"/>
+              </a:cxn>
+              <a:cxn ang="0">
+                <a:pos x="connsiteX5" y="connsiteY5"/>
+              </a:cxn>
+            </a:cxnLst>
+            <a:rect l="l" t="t" r="r" b="b"/>
+            <a:pathLst>
+              <a:path w="1565940" h="599245">
+                <a:moveTo>
+                  <a:pt x="782970" y="0"/>
+                </a:moveTo>
+                <a:cubicBezTo>
+                  <a:pt x="1117910" y="0"/>
+                  <a:pt x="1405287" y="198118"/>
+                  <a:pt x="1528042" y="480469"/>
+                </a:cubicBezTo>
+                <a:lnTo>
+                  <a:pt x="1565940" y="599245"/>
+                </a:lnTo>
+                <a:lnTo>
+                  <a:pt x="0" y="599245"/>
+                </a:lnTo>
+                <a:lnTo>
+                  <a:pt x="37898" y="480469"/>
+                </a:lnTo>
+                <a:cubicBezTo>
+                  <a:pt x="160653" y="198118"/>
+                  <a:pt x="448030" y="0"/>
+                  <a:pt x="782970" y="0"/>
+                </a:cubicBezTo>
+                <a:close/>
+              </a:path>
+            </a:pathLst>
+          </a:custGeom>
+          <a:solidFill>
+            <a:schemeClr val="accent2"/>
+          </a:solidFill>
+          <a:ln>
+            <a:noFill/>
+          </a:ln>
+        </p:spPr>
+        <p:style>
+          <a:lnRef idx="2">
+            <a:schemeClr val="accent1">
+              <a:shade val="50000"/>
+            </a:schemeClr>
+          </a:lnRef>
+          <a:fillRef idx="1">
+            <a:schemeClr val="accent1"/>
+          </a:fillRef>
+          <a:effectRef idx="0">
+            <a:schemeClr val="accent1"/>
+          </a:effectRef>
+          <a:fontRef idx="minor">
+            <a:schemeClr val="lt1"/>
+          </a:fontRef>
+        </p:style>
+        <p:txBody>
+          <a:bodyPr wrap="square" rtlCol="0" anchor="ctr">
+            <a:noAutofit/>
+          </a:bodyPr>
+          <a:lstStyle/>
+          <a:p>
+            <a:pPr algn="ctr"/>
+            <a:endParaRPr lang="en-US" dirty="0"/>
+          </a:p>
+        </p:txBody>
+      </p:sp>
+    </p:spTree>
+    <p:extLst>
+      <p:ext uri="{BB962C8B-B14F-4D97-AF65-F5344CB8AC3E}">
+        <p14:creationId xmlns:p14="http://schemas.microsoft.com/office/powerpoint/2010/main" val="831316315"/>
       </p:ext>
     </p:extLst>
   </p:cSld>

</xml_diff>